<commit_message>
update system design section.
</commit_message>
<xml_diff>
--- a/doc/designDoc.pptx
+++ b/doc/designDoc.pptx
@@ -6,6 +6,7 @@
   </p:sldMasterIdLst>
   <p:sldIdLst>
     <p:sldId id="256" r:id="rId2"/>
+    <p:sldId id="257" r:id="rId3"/>
   </p:sldIdLst>
   <p:sldSz cx="12192000" cy="6858000"/>
   <p:notesSz cx="6858000" cy="9144000"/>
@@ -104,6 +105,11 @@
       </a:defRPr>
     </a:lvl9pPr>
   </p:defaultTextStyle>
+  <p:extLst>
+    <p:ext uri="{EFAFB233-063F-42B5-8137-9DF3F51BA10A}">
+      <p15:sldGuideLst xmlns:p15="http://schemas.microsoft.com/office/powerpoint/2012/main"/>
+    </p:ext>
+  </p:extLst>
 </p:presentation>
 </file>
 
@@ -7048,6 +7054,2963 @@
     <p:extLst>
       <p:ext uri="{BB962C8B-B14F-4D97-AF65-F5344CB8AC3E}">
         <p14:creationId xmlns:p14="http://schemas.microsoft.com/office/powerpoint/2010/main" val="2647904613"/>
+      </p:ext>
+    </p:extLst>
+  </p:cSld>
+  <p:clrMapOvr>
+    <a:masterClrMapping/>
+  </p:clrMapOvr>
+</p:sld>
+</file>
+
+<file path=ppt/slides/slide2.xml><?xml version="1.0" encoding="utf-8"?>
+<p:sld xmlns:a="http://schemas.openxmlformats.org/drawingml/2006/main" xmlns:r="http://schemas.openxmlformats.org/officeDocument/2006/relationships" xmlns:p="http://schemas.openxmlformats.org/presentationml/2006/main">
+  <p:cSld>
+    <p:spTree>
+      <p:nvGrpSpPr>
+        <p:cNvPr id="1" name=""/>
+        <p:cNvGrpSpPr/>
+        <p:nvPr/>
+      </p:nvGrpSpPr>
+      <p:grpSpPr>
+        <a:xfrm>
+          <a:off x="0" y="0"/>
+          <a:ext cx="0" cy="0"/>
+          <a:chOff x="0" y="0"/>
+          <a:chExt cx="0" cy="0"/>
+        </a:xfrm>
+      </p:grpSpPr>
+      <p:cxnSp>
+        <p:nvCxnSpPr>
+          <p:cNvPr id="103" name="Straight Connector 102">
+            <a:extLst>
+              <a:ext uri="{FF2B5EF4-FFF2-40B4-BE49-F238E27FC236}">
+                <a16:creationId xmlns:a16="http://schemas.microsoft.com/office/drawing/2014/main" id="{FD18922E-B9E9-2F68-0639-7A47981E6EDE}"/>
+              </a:ext>
+            </a:extLst>
+          </p:cNvPr>
+          <p:cNvCxnSpPr>
+            <a:cxnSpLocks/>
+          </p:cNvCxnSpPr>
+          <p:nvPr/>
+        </p:nvCxnSpPr>
+        <p:spPr>
+          <a:xfrm>
+            <a:off x="6976872" y="550897"/>
+            <a:ext cx="0" cy="4258847"/>
+          </a:xfrm>
+          <a:prstGeom prst="line">
+            <a:avLst/>
+          </a:prstGeom>
+          <a:ln>
+            <a:solidFill>
+              <a:schemeClr val="bg1">
+                <a:lumMod val="65000"/>
+              </a:schemeClr>
+            </a:solidFill>
+            <a:prstDash val="dash"/>
+          </a:ln>
+        </p:spPr>
+        <p:style>
+          <a:lnRef idx="2">
+            <a:schemeClr val="accent1"/>
+          </a:lnRef>
+          <a:fillRef idx="0">
+            <a:schemeClr val="accent1"/>
+          </a:fillRef>
+          <a:effectRef idx="1">
+            <a:schemeClr val="accent1"/>
+          </a:effectRef>
+          <a:fontRef idx="minor">
+            <a:schemeClr val="tx1"/>
+          </a:fontRef>
+        </p:style>
+      </p:cxnSp>
+      <p:sp>
+        <p:nvSpPr>
+          <p:cNvPr id="100" name="Cloud 99">
+            <a:extLst>
+              <a:ext uri="{FF2B5EF4-FFF2-40B4-BE49-F238E27FC236}">
+                <a16:creationId xmlns:a16="http://schemas.microsoft.com/office/drawing/2014/main" id="{6D2DAC49-10E2-2F14-CB5B-2931D0212CBA}"/>
+              </a:ext>
+            </a:extLst>
+          </p:cNvPr>
+          <p:cNvSpPr/>
+          <p:nvPr/>
+        </p:nvSpPr>
+        <p:spPr>
+          <a:xfrm>
+            <a:off x="6247969" y="2567379"/>
+            <a:ext cx="798601" cy="502819"/>
+          </a:xfrm>
+          <a:prstGeom prst="cloud">
+            <a:avLst/>
+          </a:prstGeom>
+          <a:solidFill>
+            <a:schemeClr val="bg1">
+              <a:lumMod val="85000"/>
+            </a:schemeClr>
+          </a:solidFill>
+        </p:spPr>
+        <p:style>
+          <a:lnRef idx="2">
+            <a:schemeClr val="accent1">
+              <a:shade val="15000"/>
+            </a:schemeClr>
+          </a:lnRef>
+          <a:fillRef idx="1">
+            <a:schemeClr val="accent1"/>
+          </a:fillRef>
+          <a:effectRef idx="0">
+            <a:schemeClr val="accent1"/>
+          </a:effectRef>
+          <a:fontRef idx="minor">
+            <a:schemeClr val="lt1"/>
+          </a:fontRef>
+        </p:style>
+        <p:txBody>
+          <a:bodyPr rtlCol="0" anchor="ctr"/>
+          <a:lstStyle/>
+          <a:p>
+            <a:pPr algn="ctr"/>
+            <a:endParaRPr lang="en-SG" sz="1050" b="1" dirty="0">
+              <a:solidFill>
+                <a:schemeClr val="tx1"/>
+              </a:solidFill>
+            </a:endParaRPr>
+          </a:p>
+        </p:txBody>
+      </p:sp>
+      <p:sp>
+        <p:nvSpPr>
+          <p:cNvPr id="68" name="Rectangle 67">
+            <a:extLst>
+              <a:ext uri="{FF2B5EF4-FFF2-40B4-BE49-F238E27FC236}">
+                <a16:creationId xmlns:a16="http://schemas.microsoft.com/office/drawing/2014/main" id="{2C58E68F-1D70-9A11-0372-844F383B7565}"/>
+              </a:ext>
+            </a:extLst>
+          </p:cNvPr>
+          <p:cNvSpPr/>
+          <p:nvPr/>
+        </p:nvSpPr>
+        <p:spPr>
+          <a:xfrm>
+            <a:off x="7729936" y="3575580"/>
+            <a:ext cx="1292611" cy="553568"/>
+          </a:xfrm>
+          <a:prstGeom prst="rect">
+            <a:avLst/>
+          </a:prstGeom>
+          <a:solidFill>
+            <a:schemeClr val="bg2"/>
+          </a:solidFill>
+        </p:spPr>
+        <p:style>
+          <a:lnRef idx="2">
+            <a:schemeClr val="accent1">
+              <a:shade val="15000"/>
+            </a:schemeClr>
+          </a:lnRef>
+          <a:fillRef idx="1">
+            <a:schemeClr val="accent1"/>
+          </a:fillRef>
+          <a:effectRef idx="0">
+            <a:schemeClr val="accent1"/>
+          </a:effectRef>
+          <a:fontRef idx="minor">
+            <a:schemeClr val="lt1"/>
+          </a:fontRef>
+        </p:style>
+        <p:txBody>
+          <a:bodyPr rtlCol="0" anchor="ctr"/>
+          <a:lstStyle/>
+          <a:p>
+            <a:pPr algn="ctr"/>
+            <a:endParaRPr lang="en-SG"/>
+          </a:p>
+        </p:txBody>
+      </p:sp>
+      <p:sp>
+        <p:nvSpPr>
+          <p:cNvPr id="4" name="Rectangle 3">
+            <a:extLst>
+              <a:ext uri="{FF2B5EF4-FFF2-40B4-BE49-F238E27FC236}">
+                <a16:creationId xmlns:a16="http://schemas.microsoft.com/office/drawing/2014/main" id="{496D88C8-BD96-6952-AA27-F68D5F71DEAB}"/>
+              </a:ext>
+            </a:extLst>
+          </p:cNvPr>
+          <p:cNvSpPr/>
+          <p:nvPr/>
+        </p:nvSpPr>
+        <p:spPr>
+          <a:xfrm>
+            <a:off x="1952629" y="1494374"/>
+            <a:ext cx="1505147" cy="316062"/>
+          </a:xfrm>
+          <a:prstGeom prst="rect">
+            <a:avLst/>
+          </a:prstGeom>
+          <a:solidFill>
+            <a:schemeClr val="tx2">
+              <a:lumMod val="75000"/>
+            </a:schemeClr>
+          </a:solidFill>
+        </p:spPr>
+        <p:style>
+          <a:lnRef idx="2">
+            <a:schemeClr val="accent1">
+              <a:shade val="50000"/>
+            </a:schemeClr>
+          </a:lnRef>
+          <a:fillRef idx="1">
+            <a:schemeClr val="accent1"/>
+          </a:fillRef>
+          <a:effectRef idx="0">
+            <a:schemeClr val="accent1"/>
+          </a:effectRef>
+          <a:fontRef idx="minor">
+            <a:schemeClr val="lt1"/>
+          </a:fontRef>
+        </p:style>
+        <p:txBody>
+          <a:bodyPr rtlCol="0" anchor="ctr"/>
+          <a:lstStyle/>
+          <a:p>
+            <a:pPr algn="ctr"/>
+            <a:r>
+              <a:rPr lang="en-US" sz="1200" dirty="0"/>
+              <a:t>Function programs </a:t>
+            </a:r>
+            <a:endParaRPr lang="en-SG" sz="1200" dirty="0"/>
+          </a:p>
+        </p:txBody>
+      </p:sp>
+      <p:sp>
+        <p:nvSpPr>
+          <p:cNvPr id="5" name="Rectangle 4">
+            <a:extLst>
+              <a:ext uri="{FF2B5EF4-FFF2-40B4-BE49-F238E27FC236}">
+                <a16:creationId xmlns:a16="http://schemas.microsoft.com/office/drawing/2014/main" id="{6C55582E-04FE-061A-F785-C02A766BBE90}"/>
+              </a:ext>
+            </a:extLst>
+          </p:cNvPr>
+          <p:cNvSpPr/>
+          <p:nvPr/>
+        </p:nvSpPr>
+        <p:spPr>
+          <a:xfrm>
+            <a:off x="2232558" y="2571084"/>
+            <a:ext cx="1088441" cy="408331"/>
+          </a:xfrm>
+          <a:prstGeom prst="rect">
+            <a:avLst/>
+          </a:prstGeom>
+          <a:solidFill>
+            <a:schemeClr val="bg2"/>
+          </a:solidFill>
+        </p:spPr>
+        <p:style>
+          <a:lnRef idx="2">
+            <a:schemeClr val="accent1">
+              <a:shade val="15000"/>
+            </a:schemeClr>
+          </a:lnRef>
+          <a:fillRef idx="1">
+            <a:schemeClr val="accent1"/>
+          </a:fillRef>
+          <a:effectRef idx="0">
+            <a:schemeClr val="accent1"/>
+          </a:effectRef>
+          <a:fontRef idx="minor">
+            <a:schemeClr val="lt1"/>
+          </a:fontRef>
+        </p:style>
+        <p:txBody>
+          <a:bodyPr rtlCol="0" anchor="ctr"/>
+          <a:lstStyle/>
+          <a:p>
+            <a:pPr algn="ctr"/>
+            <a:endParaRPr lang="en-SG"/>
+          </a:p>
+        </p:txBody>
+      </p:sp>
+      <p:pic>
+        <p:nvPicPr>
+          <p:cNvPr id="6" name="Picture 5">
+            <a:extLst>
+              <a:ext uri="{FF2B5EF4-FFF2-40B4-BE49-F238E27FC236}">
+                <a16:creationId xmlns:a16="http://schemas.microsoft.com/office/drawing/2014/main" id="{1DA25188-39D5-AB9C-C956-AB6425A37745}"/>
+              </a:ext>
+            </a:extLst>
+          </p:cNvPr>
+          <p:cNvPicPr>
+            <a:picLocks noChangeAspect="1"/>
+          </p:cNvPicPr>
+          <p:nvPr/>
+        </p:nvPicPr>
+        <p:blipFill>
+          <a:blip r:embed="rId2"/>
+          <a:stretch>
+            <a:fillRect/>
+          </a:stretch>
+        </p:blipFill>
+        <p:spPr>
+          <a:xfrm>
+            <a:off x="2291633" y="2619470"/>
+            <a:ext cx="261165" cy="276835"/>
+          </a:xfrm>
+          <a:prstGeom prst="rect">
+            <a:avLst/>
+          </a:prstGeom>
+        </p:spPr>
+      </p:pic>
+      <p:pic>
+        <p:nvPicPr>
+          <p:cNvPr id="7" name="Picture 6">
+            <a:extLst>
+              <a:ext uri="{FF2B5EF4-FFF2-40B4-BE49-F238E27FC236}">
+                <a16:creationId xmlns:a16="http://schemas.microsoft.com/office/drawing/2014/main" id="{197E98A7-FB19-A178-8AE5-3973524022B1}"/>
+              </a:ext>
+            </a:extLst>
+          </p:cNvPr>
+          <p:cNvPicPr>
+            <a:picLocks noChangeAspect="1"/>
+          </p:cNvPicPr>
+          <p:nvPr/>
+        </p:nvPicPr>
+        <p:blipFill>
+          <a:blip r:embed="rId2"/>
+          <a:stretch>
+            <a:fillRect/>
+          </a:stretch>
+        </p:blipFill>
+        <p:spPr>
+          <a:xfrm>
+            <a:off x="2627540" y="2619470"/>
+            <a:ext cx="261165" cy="276835"/>
+          </a:xfrm>
+          <a:prstGeom prst="rect">
+            <a:avLst/>
+          </a:prstGeom>
+        </p:spPr>
+      </p:pic>
+      <p:pic>
+        <p:nvPicPr>
+          <p:cNvPr id="8" name="Picture 7">
+            <a:extLst>
+              <a:ext uri="{FF2B5EF4-FFF2-40B4-BE49-F238E27FC236}">
+                <a16:creationId xmlns:a16="http://schemas.microsoft.com/office/drawing/2014/main" id="{FE4E10A0-AEE1-CA69-AF29-3F1CEB5AF14E}"/>
+              </a:ext>
+            </a:extLst>
+          </p:cNvPr>
+          <p:cNvPicPr>
+            <a:picLocks noChangeAspect="1"/>
+          </p:cNvPicPr>
+          <p:nvPr/>
+        </p:nvPicPr>
+        <p:blipFill>
+          <a:blip r:embed="rId2"/>
+          <a:stretch>
+            <a:fillRect/>
+          </a:stretch>
+        </p:blipFill>
+        <p:spPr>
+          <a:xfrm>
+            <a:off x="2986741" y="2619470"/>
+            <a:ext cx="261165" cy="276835"/>
+          </a:xfrm>
+          <a:prstGeom prst="rect">
+            <a:avLst/>
+          </a:prstGeom>
+        </p:spPr>
+      </p:pic>
+      <p:sp>
+        <p:nvSpPr>
+          <p:cNvPr id="9" name="TextBox 8">
+            <a:extLst>
+              <a:ext uri="{FF2B5EF4-FFF2-40B4-BE49-F238E27FC236}">
+                <a16:creationId xmlns:a16="http://schemas.microsoft.com/office/drawing/2014/main" id="{D00B3B4F-06B8-90F9-4153-D2B91596C555}"/>
+              </a:ext>
+            </a:extLst>
+          </p:cNvPr>
+          <p:cNvSpPr txBox="1"/>
+          <p:nvPr/>
+        </p:nvSpPr>
+        <p:spPr>
+          <a:xfrm>
+            <a:off x="2146391" y="2331315"/>
+            <a:ext cx="1260772" cy="261610"/>
+          </a:xfrm>
+          <a:prstGeom prst="rect">
+            <a:avLst/>
+          </a:prstGeom>
+          <a:noFill/>
+        </p:spPr>
+        <p:txBody>
+          <a:bodyPr wrap="square" rtlCol="0">
+            <a:spAutoFit/>
+          </a:bodyPr>
+          <a:lstStyle/>
+          <a:p>
+            <a:r>
+              <a:rPr lang="en-US" sz="1050" b="1" dirty="0"/>
+              <a:t>Local log storage </a:t>
+            </a:r>
+            <a:endParaRPr lang="en-SG" sz="1050" b="1" dirty="0"/>
+          </a:p>
+        </p:txBody>
+      </p:sp>
+      <p:cxnSp>
+        <p:nvCxnSpPr>
+          <p:cNvPr id="11" name="Connector: Elbow 10">
+            <a:extLst>
+              <a:ext uri="{FF2B5EF4-FFF2-40B4-BE49-F238E27FC236}">
+                <a16:creationId xmlns:a16="http://schemas.microsoft.com/office/drawing/2014/main" id="{22E5D778-3240-E25B-D41E-524984A90173}"/>
+              </a:ext>
+            </a:extLst>
+          </p:cNvPr>
+          <p:cNvCxnSpPr>
+            <a:cxnSpLocks/>
+            <a:stCxn id="4" idx="2"/>
+            <a:endCxn id="6" idx="1"/>
+          </p:cNvCxnSpPr>
+          <p:nvPr/>
+        </p:nvCxnSpPr>
+        <p:spPr>
+          <a:xfrm rot="5400000">
+            <a:off x="2024692" y="2077377"/>
+            <a:ext cx="947452" cy="413570"/>
+          </a:xfrm>
+          <a:prstGeom prst="bentConnector4">
+            <a:avLst>
+              <a:gd name="adj1" fmla="val 42695"/>
+              <a:gd name="adj2" fmla="val 155275"/>
+            </a:avLst>
+          </a:prstGeom>
+          <a:ln>
+            <a:prstDash val="sysDash"/>
+            <a:tailEnd type="triangle"/>
+          </a:ln>
+        </p:spPr>
+        <p:style>
+          <a:lnRef idx="2">
+            <a:schemeClr val="accent1"/>
+          </a:lnRef>
+          <a:fillRef idx="0">
+            <a:schemeClr val="accent1"/>
+          </a:fillRef>
+          <a:effectRef idx="1">
+            <a:schemeClr val="accent1"/>
+          </a:effectRef>
+          <a:fontRef idx="minor">
+            <a:schemeClr val="tx1"/>
+          </a:fontRef>
+        </p:style>
+      </p:cxnSp>
+      <p:sp>
+        <p:nvSpPr>
+          <p:cNvPr id="13" name="TextBox 12">
+            <a:extLst>
+              <a:ext uri="{FF2B5EF4-FFF2-40B4-BE49-F238E27FC236}">
+                <a16:creationId xmlns:a16="http://schemas.microsoft.com/office/drawing/2014/main" id="{6C632DF0-708C-63FD-4A42-261E68062EB5}"/>
+              </a:ext>
+            </a:extLst>
+          </p:cNvPr>
+          <p:cNvSpPr txBox="1"/>
+          <p:nvPr/>
+        </p:nvSpPr>
+        <p:spPr>
+          <a:xfrm>
+            <a:off x="1923950" y="1819768"/>
+            <a:ext cx="928254" cy="415498"/>
+          </a:xfrm>
+          <a:prstGeom prst="rect">
+            <a:avLst/>
+          </a:prstGeom>
+          <a:noFill/>
+        </p:spPr>
+        <p:txBody>
+          <a:bodyPr wrap="square" rtlCol="0">
+            <a:spAutoFit/>
+          </a:bodyPr>
+          <a:lstStyle/>
+          <a:p>
+            <a:r>
+              <a:rPr lang="en-US" sz="1050" dirty="0"/>
+              <a:t>Create log files</a:t>
+            </a:r>
+            <a:endParaRPr lang="en-SG" sz="1050" dirty="0"/>
+          </a:p>
+        </p:txBody>
+      </p:sp>
+      <p:sp>
+        <p:nvSpPr>
+          <p:cNvPr id="14" name="Rectangle 13">
+            <a:extLst>
+              <a:ext uri="{FF2B5EF4-FFF2-40B4-BE49-F238E27FC236}">
+                <a16:creationId xmlns:a16="http://schemas.microsoft.com/office/drawing/2014/main" id="{62560CF6-5A8E-9887-6077-F154D0313745}"/>
+              </a:ext>
+            </a:extLst>
+          </p:cNvPr>
+          <p:cNvSpPr/>
+          <p:nvPr/>
+        </p:nvSpPr>
+        <p:spPr>
+          <a:xfrm>
+            <a:off x="3761753" y="1214053"/>
+            <a:ext cx="1614919" cy="276834"/>
+          </a:xfrm>
+          <a:prstGeom prst="rect">
+            <a:avLst/>
+          </a:prstGeom>
+          <a:solidFill>
+            <a:schemeClr val="accent2">
+              <a:lumMod val="75000"/>
+            </a:schemeClr>
+          </a:solidFill>
+        </p:spPr>
+        <p:style>
+          <a:lnRef idx="2">
+            <a:schemeClr val="accent1">
+              <a:shade val="50000"/>
+            </a:schemeClr>
+          </a:lnRef>
+          <a:fillRef idx="1">
+            <a:schemeClr val="accent1"/>
+          </a:fillRef>
+          <a:effectRef idx="0">
+            <a:schemeClr val="accent1"/>
+          </a:effectRef>
+          <a:fontRef idx="minor">
+            <a:schemeClr val="lt1"/>
+          </a:fontRef>
+        </p:style>
+        <p:txBody>
+          <a:bodyPr rtlCol="0" anchor="ctr"/>
+          <a:lstStyle/>
+          <a:p>
+            <a:pPr algn="ctr"/>
+            <a:r>
+              <a:rPr lang="en-US" sz="1200" dirty="0"/>
+              <a:t>Log Archive Agent Init </a:t>
+            </a:r>
+            <a:endParaRPr lang="en-SG" sz="1200" dirty="0"/>
+          </a:p>
+        </p:txBody>
+      </p:sp>
+      <p:pic>
+        <p:nvPicPr>
+          <p:cNvPr id="16" name="Picture 15">
+            <a:extLst>
+              <a:ext uri="{FF2B5EF4-FFF2-40B4-BE49-F238E27FC236}">
+                <a16:creationId xmlns:a16="http://schemas.microsoft.com/office/drawing/2014/main" id="{9ABF01B6-5F7F-F0FC-0810-7C7C627A0DA4}"/>
+              </a:ext>
+            </a:extLst>
+          </p:cNvPr>
+          <p:cNvPicPr>
+            <a:picLocks noChangeAspect="1"/>
+          </p:cNvPicPr>
+          <p:nvPr/>
+        </p:nvPicPr>
+        <p:blipFill>
+          <a:blip r:embed="rId3"/>
+          <a:stretch>
+            <a:fillRect/>
+          </a:stretch>
+        </p:blipFill>
+        <p:spPr>
+          <a:xfrm>
+            <a:off x="5680648" y="1092875"/>
+            <a:ext cx="391132" cy="488914"/>
+          </a:xfrm>
+          <a:prstGeom prst="rect">
+            <a:avLst/>
+          </a:prstGeom>
+        </p:spPr>
+      </p:pic>
+      <p:cxnSp>
+        <p:nvCxnSpPr>
+          <p:cNvPr id="18" name="Straight Arrow Connector 17">
+            <a:extLst>
+              <a:ext uri="{FF2B5EF4-FFF2-40B4-BE49-F238E27FC236}">
+                <a16:creationId xmlns:a16="http://schemas.microsoft.com/office/drawing/2014/main" id="{F94E17D0-8445-9BF2-4BE2-18DFC68052C3}"/>
+              </a:ext>
+            </a:extLst>
+          </p:cNvPr>
+          <p:cNvCxnSpPr>
+            <a:cxnSpLocks/>
+            <a:stCxn id="16" idx="1"/>
+          </p:cNvCxnSpPr>
+          <p:nvPr/>
+        </p:nvCxnSpPr>
+        <p:spPr>
+          <a:xfrm flipH="1">
+            <a:off x="5376672" y="1337332"/>
+            <a:ext cx="303976" cy="0"/>
+          </a:xfrm>
+          <a:prstGeom prst="straightConnector1">
+            <a:avLst/>
+          </a:prstGeom>
+          <a:ln>
+            <a:prstDash val="sysDash"/>
+            <a:tailEnd type="triangle"/>
+          </a:ln>
+        </p:spPr>
+        <p:style>
+          <a:lnRef idx="2">
+            <a:schemeClr val="accent1"/>
+          </a:lnRef>
+          <a:fillRef idx="0">
+            <a:schemeClr val="accent1"/>
+          </a:fillRef>
+          <a:effectRef idx="1">
+            <a:schemeClr val="accent1"/>
+          </a:effectRef>
+          <a:fontRef idx="minor">
+            <a:schemeClr val="tx1"/>
+          </a:fontRef>
+        </p:style>
+      </p:cxnSp>
+      <p:sp>
+        <p:nvSpPr>
+          <p:cNvPr id="19" name="TextBox 18">
+            <a:extLst>
+              <a:ext uri="{FF2B5EF4-FFF2-40B4-BE49-F238E27FC236}">
+                <a16:creationId xmlns:a16="http://schemas.microsoft.com/office/drawing/2014/main" id="{70BCD31F-3A65-DFE0-52C3-0BDE59819CF1}"/>
+              </a:ext>
+            </a:extLst>
+          </p:cNvPr>
+          <p:cNvSpPr txBox="1"/>
+          <p:nvPr/>
+        </p:nvSpPr>
+        <p:spPr>
+          <a:xfrm>
+            <a:off x="6070599" y="1102672"/>
+            <a:ext cx="813841" cy="415498"/>
+          </a:xfrm>
+          <a:prstGeom prst="rect">
+            <a:avLst/>
+          </a:prstGeom>
+          <a:noFill/>
+        </p:spPr>
+        <p:txBody>
+          <a:bodyPr wrap="square" rtlCol="0">
+            <a:spAutoFit/>
+          </a:bodyPr>
+          <a:lstStyle/>
+          <a:p>
+            <a:r>
+              <a:rPr lang="en-US" sz="1050" dirty="0"/>
+              <a:t>Agent config  file</a:t>
+            </a:r>
+            <a:endParaRPr lang="en-SG" sz="1050" dirty="0"/>
+          </a:p>
+        </p:txBody>
+      </p:sp>
+      <p:sp>
+        <p:nvSpPr>
+          <p:cNvPr id="20" name="Rectangle 19">
+            <a:extLst>
+              <a:ext uri="{FF2B5EF4-FFF2-40B4-BE49-F238E27FC236}">
+                <a16:creationId xmlns:a16="http://schemas.microsoft.com/office/drawing/2014/main" id="{B7213DE0-86D4-AD5C-94BE-501C084D4EAA}"/>
+              </a:ext>
+            </a:extLst>
+          </p:cNvPr>
+          <p:cNvSpPr/>
+          <p:nvPr/>
+        </p:nvSpPr>
+        <p:spPr>
+          <a:xfrm>
+            <a:off x="3761752" y="1876002"/>
+            <a:ext cx="1614919" cy="276834"/>
+          </a:xfrm>
+          <a:prstGeom prst="rect">
+            <a:avLst/>
+          </a:prstGeom>
+          <a:solidFill>
+            <a:schemeClr val="accent2">
+              <a:lumMod val="75000"/>
+            </a:schemeClr>
+          </a:solidFill>
+        </p:spPr>
+        <p:style>
+          <a:lnRef idx="2">
+            <a:schemeClr val="accent1">
+              <a:shade val="50000"/>
+            </a:schemeClr>
+          </a:lnRef>
+          <a:fillRef idx="1">
+            <a:schemeClr val="accent1"/>
+          </a:fillRef>
+          <a:effectRef idx="0">
+            <a:schemeClr val="accent1"/>
+          </a:effectRef>
+          <a:fontRef idx="minor">
+            <a:schemeClr val="lt1"/>
+          </a:fontRef>
+        </p:style>
+        <p:txBody>
+          <a:bodyPr rtlCol="0" anchor="ctr"/>
+          <a:lstStyle/>
+          <a:p>
+            <a:pPr algn="ctr"/>
+            <a:r>
+              <a:rPr lang="en-US" sz="1200" dirty="0"/>
+              <a:t>Record manager </a:t>
+            </a:r>
+            <a:endParaRPr lang="en-SG" sz="1200" dirty="0"/>
+          </a:p>
+        </p:txBody>
+      </p:sp>
+      <p:cxnSp>
+        <p:nvCxnSpPr>
+          <p:cNvPr id="22" name="Straight Arrow Connector 21">
+            <a:extLst>
+              <a:ext uri="{FF2B5EF4-FFF2-40B4-BE49-F238E27FC236}">
+                <a16:creationId xmlns:a16="http://schemas.microsoft.com/office/drawing/2014/main" id="{4D1BA325-B458-8E68-D9F2-5227D907CC92}"/>
+              </a:ext>
+            </a:extLst>
+          </p:cNvPr>
+          <p:cNvCxnSpPr>
+            <a:stCxn id="14" idx="2"/>
+            <a:endCxn id="20" idx="0"/>
+          </p:cNvCxnSpPr>
+          <p:nvPr/>
+        </p:nvCxnSpPr>
+        <p:spPr>
+          <a:xfrm flipH="1">
+            <a:off x="4569212" y="1490887"/>
+            <a:ext cx="1" cy="385115"/>
+          </a:xfrm>
+          <a:prstGeom prst="straightConnector1">
+            <a:avLst/>
+          </a:prstGeom>
+          <a:ln>
+            <a:tailEnd type="triangle"/>
+          </a:ln>
+        </p:spPr>
+        <p:style>
+          <a:lnRef idx="2">
+            <a:schemeClr val="dk1"/>
+          </a:lnRef>
+          <a:fillRef idx="0">
+            <a:schemeClr val="dk1"/>
+          </a:fillRef>
+          <a:effectRef idx="1">
+            <a:schemeClr val="dk1"/>
+          </a:effectRef>
+          <a:fontRef idx="minor">
+            <a:schemeClr val="tx1"/>
+          </a:fontRef>
+        </p:style>
+      </p:cxnSp>
+      <p:sp>
+        <p:nvSpPr>
+          <p:cNvPr id="23" name="TextBox 22">
+            <a:extLst>
+              <a:ext uri="{FF2B5EF4-FFF2-40B4-BE49-F238E27FC236}">
+                <a16:creationId xmlns:a16="http://schemas.microsoft.com/office/drawing/2014/main" id="{A1B5F95B-A149-1892-2605-E67E22F28CA3}"/>
+              </a:ext>
+            </a:extLst>
+          </p:cNvPr>
+          <p:cNvSpPr txBox="1"/>
+          <p:nvPr/>
+        </p:nvSpPr>
+        <p:spPr>
+          <a:xfrm>
+            <a:off x="4541040" y="1587167"/>
+            <a:ext cx="928254" cy="253916"/>
+          </a:xfrm>
+          <a:prstGeom prst="rect">
+            <a:avLst/>
+          </a:prstGeom>
+          <a:noFill/>
+        </p:spPr>
+        <p:txBody>
+          <a:bodyPr wrap="square" rtlCol="0">
+            <a:spAutoFit/>
+          </a:bodyPr>
+          <a:lstStyle/>
+          <a:p>
+            <a:r>
+              <a:rPr lang="en-US" sz="1050" b="1" dirty="0">
+                <a:solidFill>
+                  <a:schemeClr val="accent2">
+                    <a:lumMod val="75000"/>
+                  </a:schemeClr>
+                </a:solidFill>
+              </a:rPr>
+              <a:t>Main thread </a:t>
+            </a:r>
+            <a:endParaRPr lang="en-SG" sz="1050" b="1" dirty="0">
+              <a:solidFill>
+                <a:schemeClr val="accent2">
+                  <a:lumMod val="75000"/>
+                </a:schemeClr>
+              </a:solidFill>
+            </a:endParaRPr>
+          </a:p>
+        </p:txBody>
+      </p:sp>
+      <p:pic>
+        <p:nvPicPr>
+          <p:cNvPr id="24" name="Picture 23">
+            <a:extLst>
+              <a:ext uri="{FF2B5EF4-FFF2-40B4-BE49-F238E27FC236}">
+                <a16:creationId xmlns:a16="http://schemas.microsoft.com/office/drawing/2014/main" id="{95BC0253-1333-F998-53CB-116684E1A0E7}"/>
+              </a:ext>
+            </a:extLst>
+          </p:cNvPr>
+          <p:cNvPicPr>
+            <a:picLocks noChangeAspect="1"/>
+          </p:cNvPicPr>
+          <p:nvPr/>
+        </p:nvPicPr>
+        <p:blipFill>
+          <a:blip r:embed="rId4"/>
+          <a:stretch>
+            <a:fillRect/>
+          </a:stretch>
+        </p:blipFill>
+        <p:spPr>
+          <a:xfrm>
+            <a:off x="5680648" y="1810864"/>
+            <a:ext cx="391133" cy="469360"/>
+          </a:xfrm>
+          <a:prstGeom prst="rect">
+            <a:avLst/>
+          </a:prstGeom>
+        </p:spPr>
+      </p:pic>
+      <p:sp>
+        <p:nvSpPr>
+          <p:cNvPr id="25" name="TextBox 24">
+            <a:extLst>
+              <a:ext uri="{FF2B5EF4-FFF2-40B4-BE49-F238E27FC236}">
+                <a16:creationId xmlns:a16="http://schemas.microsoft.com/office/drawing/2014/main" id="{70FCC12F-FBCB-A1AF-B123-E283DC6CC99A}"/>
+              </a:ext>
+            </a:extLst>
+          </p:cNvPr>
+          <p:cNvSpPr txBox="1"/>
+          <p:nvPr/>
+        </p:nvSpPr>
+        <p:spPr>
+          <a:xfrm>
+            <a:off x="5996947" y="1754234"/>
+            <a:ext cx="738172" cy="577081"/>
+          </a:xfrm>
+          <a:prstGeom prst="rect">
+            <a:avLst/>
+          </a:prstGeom>
+          <a:noFill/>
+        </p:spPr>
+        <p:txBody>
+          <a:bodyPr wrap="square" rtlCol="0">
+            <a:spAutoFit/>
+          </a:bodyPr>
+          <a:lstStyle/>
+          <a:p>
+            <a:r>
+              <a:rPr lang="en-US" sz="1050" dirty="0"/>
+              <a:t>Log file uploaded record </a:t>
+            </a:r>
+            <a:endParaRPr lang="en-SG" sz="1050" dirty="0"/>
+          </a:p>
+        </p:txBody>
+      </p:sp>
+      <p:cxnSp>
+        <p:nvCxnSpPr>
+          <p:cNvPr id="29" name="Straight Arrow Connector 28">
+            <a:extLst>
+              <a:ext uri="{FF2B5EF4-FFF2-40B4-BE49-F238E27FC236}">
+                <a16:creationId xmlns:a16="http://schemas.microsoft.com/office/drawing/2014/main" id="{2492E826-3D95-021C-EEEC-FD254A42EAC4}"/>
+              </a:ext>
+            </a:extLst>
+          </p:cNvPr>
+          <p:cNvCxnSpPr>
+            <a:cxnSpLocks/>
+          </p:cNvCxnSpPr>
+          <p:nvPr/>
+        </p:nvCxnSpPr>
+        <p:spPr>
+          <a:xfrm flipH="1">
+            <a:off x="5376671" y="1999213"/>
+            <a:ext cx="303976" cy="0"/>
+          </a:xfrm>
+          <a:prstGeom prst="straightConnector1">
+            <a:avLst/>
+          </a:prstGeom>
+          <a:ln>
+            <a:prstDash val="sysDash"/>
+            <a:tailEnd type="triangle"/>
+          </a:ln>
+        </p:spPr>
+        <p:style>
+          <a:lnRef idx="2">
+            <a:schemeClr val="accent1"/>
+          </a:lnRef>
+          <a:fillRef idx="0">
+            <a:schemeClr val="accent1"/>
+          </a:fillRef>
+          <a:effectRef idx="1">
+            <a:schemeClr val="accent1"/>
+          </a:effectRef>
+          <a:fontRef idx="minor">
+            <a:schemeClr val="tx1"/>
+          </a:fontRef>
+        </p:style>
+      </p:cxnSp>
+      <p:sp>
+        <p:nvSpPr>
+          <p:cNvPr id="30" name="Rectangle 29">
+            <a:extLst>
+              <a:ext uri="{FF2B5EF4-FFF2-40B4-BE49-F238E27FC236}">
+                <a16:creationId xmlns:a16="http://schemas.microsoft.com/office/drawing/2014/main" id="{51D73CC6-7F4F-5922-9FA4-4B322CF3394C}"/>
+              </a:ext>
+            </a:extLst>
+          </p:cNvPr>
+          <p:cNvSpPr/>
+          <p:nvPr/>
+        </p:nvSpPr>
+        <p:spPr>
+          <a:xfrm>
+            <a:off x="3761752" y="2538442"/>
+            <a:ext cx="1317949" cy="357863"/>
+          </a:xfrm>
+          <a:prstGeom prst="rect">
+            <a:avLst/>
+          </a:prstGeom>
+          <a:solidFill>
+            <a:schemeClr val="accent2">
+              <a:lumMod val="75000"/>
+            </a:schemeClr>
+          </a:solidFill>
+        </p:spPr>
+        <p:style>
+          <a:lnRef idx="2">
+            <a:schemeClr val="accent1">
+              <a:shade val="50000"/>
+            </a:schemeClr>
+          </a:lnRef>
+          <a:fillRef idx="1">
+            <a:schemeClr val="accent1"/>
+          </a:fillRef>
+          <a:effectRef idx="0">
+            <a:schemeClr val="accent1"/>
+          </a:effectRef>
+          <a:fontRef idx="minor">
+            <a:schemeClr val="lt1"/>
+          </a:fontRef>
+        </p:style>
+        <p:txBody>
+          <a:bodyPr rtlCol="0" anchor="ctr"/>
+          <a:lstStyle/>
+          <a:p>
+            <a:pPr algn="ctr"/>
+            <a:r>
+              <a:rPr lang="en-US" sz="1200" dirty="0"/>
+              <a:t>Log directory tree generator </a:t>
+            </a:r>
+            <a:endParaRPr lang="en-SG" sz="1200" dirty="0"/>
+          </a:p>
+        </p:txBody>
+      </p:sp>
+      <p:cxnSp>
+        <p:nvCxnSpPr>
+          <p:cNvPr id="31" name="Straight Arrow Connector 30">
+            <a:extLst>
+              <a:ext uri="{FF2B5EF4-FFF2-40B4-BE49-F238E27FC236}">
+                <a16:creationId xmlns:a16="http://schemas.microsoft.com/office/drawing/2014/main" id="{CCC4D898-E624-6F4E-F398-6F1C03C84DF2}"/>
+              </a:ext>
+            </a:extLst>
+          </p:cNvPr>
+          <p:cNvCxnSpPr/>
+          <p:nvPr/>
+        </p:nvCxnSpPr>
+        <p:spPr>
+          <a:xfrm flipH="1">
+            <a:off x="4571250" y="2146831"/>
+            <a:ext cx="1" cy="385115"/>
+          </a:xfrm>
+          <a:prstGeom prst="straightConnector1">
+            <a:avLst/>
+          </a:prstGeom>
+          <a:ln>
+            <a:tailEnd type="triangle"/>
+          </a:ln>
+        </p:spPr>
+        <p:style>
+          <a:lnRef idx="2">
+            <a:schemeClr val="dk1"/>
+          </a:lnRef>
+          <a:fillRef idx="0">
+            <a:schemeClr val="dk1"/>
+          </a:fillRef>
+          <a:effectRef idx="1">
+            <a:schemeClr val="dk1"/>
+          </a:effectRef>
+          <a:fontRef idx="minor">
+            <a:schemeClr val="tx1"/>
+          </a:fontRef>
+        </p:style>
+      </p:cxnSp>
+      <p:cxnSp>
+        <p:nvCxnSpPr>
+          <p:cNvPr id="32" name="Straight Arrow Connector 31">
+            <a:extLst>
+              <a:ext uri="{FF2B5EF4-FFF2-40B4-BE49-F238E27FC236}">
+                <a16:creationId xmlns:a16="http://schemas.microsoft.com/office/drawing/2014/main" id="{AB29D6D9-05C6-3D31-DFEA-31D271D25E73}"/>
+              </a:ext>
+            </a:extLst>
+          </p:cNvPr>
+          <p:cNvCxnSpPr>
+            <a:cxnSpLocks/>
+            <a:stCxn id="30" idx="1"/>
+          </p:cNvCxnSpPr>
+          <p:nvPr/>
+        </p:nvCxnSpPr>
+        <p:spPr>
+          <a:xfrm flipH="1" flipV="1">
+            <a:off x="3320999" y="2717373"/>
+            <a:ext cx="440753" cy="1"/>
+          </a:xfrm>
+          <a:prstGeom prst="straightConnector1">
+            <a:avLst/>
+          </a:prstGeom>
+          <a:ln>
+            <a:tailEnd type="triangle"/>
+          </a:ln>
+        </p:spPr>
+        <p:style>
+          <a:lnRef idx="2">
+            <a:schemeClr val="dk1"/>
+          </a:lnRef>
+          <a:fillRef idx="0">
+            <a:schemeClr val="dk1"/>
+          </a:fillRef>
+          <a:effectRef idx="1">
+            <a:schemeClr val="dk1"/>
+          </a:effectRef>
+          <a:fontRef idx="minor">
+            <a:schemeClr val="tx1"/>
+          </a:fontRef>
+        </p:style>
+      </p:cxnSp>
+      <p:sp>
+        <p:nvSpPr>
+          <p:cNvPr id="35" name="Rectangle 34">
+            <a:extLst>
+              <a:ext uri="{FF2B5EF4-FFF2-40B4-BE49-F238E27FC236}">
+                <a16:creationId xmlns:a16="http://schemas.microsoft.com/office/drawing/2014/main" id="{BFE26ECC-5C79-100C-9923-98C6F5E0D7F5}"/>
+              </a:ext>
+            </a:extLst>
+          </p:cNvPr>
+          <p:cNvSpPr/>
+          <p:nvPr/>
+        </p:nvSpPr>
+        <p:spPr>
+          <a:xfrm>
+            <a:off x="3761751" y="3250068"/>
+            <a:ext cx="1317949" cy="357863"/>
+          </a:xfrm>
+          <a:prstGeom prst="rect">
+            <a:avLst/>
+          </a:prstGeom>
+          <a:solidFill>
+            <a:schemeClr val="accent2">
+              <a:lumMod val="75000"/>
+            </a:schemeClr>
+          </a:solidFill>
+        </p:spPr>
+        <p:style>
+          <a:lnRef idx="2">
+            <a:schemeClr val="accent1">
+              <a:shade val="50000"/>
+            </a:schemeClr>
+          </a:lnRef>
+          <a:fillRef idx="1">
+            <a:schemeClr val="accent1"/>
+          </a:fillRef>
+          <a:effectRef idx="0">
+            <a:schemeClr val="accent1"/>
+          </a:effectRef>
+          <a:fontRef idx="minor">
+            <a:schemeClr val="lt1"/>
+          </a:fontRef>
+        </p:style>
+        <p:txBody>
+          <a:bodyPr rtlCol="0" anchor="ctr"/>
+          <a:lstStyle/>
+          <a:p>
+            <a:pPr algn="ctr"/>
+            <a:r>
+              <a:rPr lang="en-US" sz="1200" dirty="0"/>
+              <a:t>New log upload queue manager </a:t>
+            </a:r>
+            <a:endParaRPr lang="en-SG" sz="1200" dirty="0"/>
+          </a:p>
+        </p:txBody>
+      </p:sp>
+      <p:cxnSp>
+        <p:nvCxnSpPr>
+          <p:cNvPr id="36" name="Connector: Elbow 35">
+            <a:extLst>
+              <a:ext uri="{FF2B5EF4-FFF2-40B4-BE49-F238E27FC236}">
+                <a16:creationId xmlns:a16="http://schemas.microsoft.com/office/drawing/2014/main" id="{00EC06A7-8EBF-3F0D-D534-6B0A1E6FE489}"/>
+              </a:ext>
+            </a:extLst>
+          </p:cNvPr>
+          <p:cNvCxnSpPr>
+            <a:cxnSpLocks/>
+            <a:stCxn id="7" idx="2"/>
+            <a:endCxn id="35" idx="1"/>
+          </p:cNvCxnSpPr>
+          <p:nvPr/>
+        </p:nvCxnSpPr>
+        <p:spPr>
+          <a:xfrm rot="16200000" flipH="1">
+            <a:off x="2993590" y="2660838"/>
+            <a:ext cx="532695" cy="1003628"/>
+          </a:xfrm>
+          <a:prstGeom prst="bentConnector2">
+            <a:avLst/>
+          </a:prstGeom>
+          <a:ln>
+            <a:prstDash val="sysDash"/>
+            <a:tailEnd type="triangle"/>
+          </a:ln>
+        </p:spPr>
+        <p:style>
+          <a:lnRef idx="2">
+            <a:schemeClr val="accent1"/>
+          </a:lnRef>
+          <a:fillRef idx="0">
+            <a:schemeClr val="accent1"/>
+          </a:fillRef>
+          <a:effectRef idx="1">
+            <a:schemeClr val="accent1"/>
+          </a:effectRef>
+          <a:fontRef idx="minor">
+            <a:schemeClr val="tx1"/>
+          </a:fontRef>
+        </p:style>
+      </p:cxnSp>
+      <p:cxnSp>
+        <p:nvCxnSpPr>
+          <p:cNvPr id="39" name="Straight Arrow Connector 38">
+            <a:extLst>
+              <a:ext uri="{FF2B5EF4-FFF2-40B4-BE49-F238E27FC236}">
+                <a16:creationId xmlns:a16="http://schemas.microsoft.com/office/drawing/2014/main" id="{C246206C-2EB8-9240-56E6-18AFA09AF31E}"/>
+              </a:ext>
+            </a:extLst>
+          </p:cNvPr>
+          <p:cNvCxnSpPr>
+            <a:cxnSpLocks/>
+          </p:cNvCxnSpPr>
+          <p:nvPr/>
+        </p:nvCxnSpPr>
+        <p:spPr>
+          <a:xfrm>
+            <a:off x="4569212" y="2902801"/>
+            <a:ext cx="0" cy="347267"/>
+          </a:xfrm>
+          <a:prstGeom prst="straightConnector1">
+            <a:avLst/>
+          </a:prstGeom>
+          <a:ln>
+            <a:tailEnd type="triangle"/>
+          </a:ln>
+        </p:spPr>
+        <p:style>
+          <a:lnRef idx="2">
+            <a:schemeClr val="dk1"/>
+          </a:lnRef>
+          <a:fillRef idx="0">
+            <a:schemeClr val="dk1"/>
+          </a:fillRef>
+          <a:effectRef idx="1">
+            <a:schemeClr val="dk1"/>
+          </a:effectRef>
+          <a:fontRef idx="minor">
+            <a:schemeClr val="tx1"/>
+          </a:fontRef>
+        </p:style>
+      </p:cxnSp>
+      <p:sp>
+        <p:nvSpPr>
+          <p:cNvPr id="41" name="Rectangle 40">
+            <a:extLst>
+              <a:ext uri="{FF2B5EF4-FFF2-40B4-BE49-F238E27FC236}">
+                <a16:creationId xmlns:a16="http://schemas.microsoft.com/office/drawing/2014/main" id="{DF178ED5-4C6A-02E9-BC97-BF2DF07276AF}"/>
+              </a:ext>
+            </a:extLst>
+          </p:cNvPr>
+          <p:cNvSpPr/>
+          <p:nvPr/>
+        </p:nvSpPr>
+        <p:spPr>
+          <a:xfrm>
+            <a:off x="4284364" y="4042733"/>
+            <a:ext cx="1092307" cy="276834"/>
+          </a:xfrm>
+          <a:prstGeom prst="rect">
+            <a:avLst/>
+          </a:prstGeom>
+          <a:solidFill>
+            <a:schemeClr val="accent2">
+              <a:lumMod val="75000"/>
+            </a:schemeClr>
+          </a:solidFill>
+        </p:spPr>
+        <p:style>
+          <a:lnRef idx="2">
+            <a:schemeClr val="accent1">
+              <a:shade val="50000"/>
+            </a:schemeClr>
+          </a:lnRef>
+          <a:fillRef idx="1">
+            <a:schemeClr val="accent1"/>
+          </a:fillRef>
+          <a:effectRef idx="0">
+            <a:schemeClr val="accent1"/>
+          </a:effectRef>
+          <a:fontRef idx="minor">
+            <a:schemeClr val="lt1"/>
+          </a:fontRef>
+        </p:style>
+        <p:txBody>
+          <a:bodyPr rtlCol="0" anchor="ctr"/>
+          <a:lstStyle/>
+          <a:p>
+            <a:pPr algn="ctr"/>
+            <a:r>
+              <a:rPr lang="en-US" sz="1200" dirty="0"/>
+              <a:t>FTP Client</a:t>
+            </a:r>
+            <a:endParaRPr lang="en-SG" sz="1200" dirty="0"/>
+          </a:p>
+        </p:txBody>
+      </p:sp>
+      <p:cxnSp>
+        <p:nvCxnSpPr>
+          <p:cNvPr id="42" name="Straight Arrow Connector 41">
+            <a:extLst>
+              <a:ext uri="{FF2B5EF4-FFF2-40B4-BE49-F238E27FC236}">
+                <a16:creationId xmlns:a16="http://schemas.microsoft.com/office/drawing/2014/main" id="{BD992CBA-34C7-8132-4F9D-6BC4BE0E0986}"/>
+              </a:ext>
+            </a:extLst>
+          </p:cNvPr>
+          <p:cNvCxnSpPr>
+            <a:cxnSpLocks/>
+          </p:cNvCxnSpPr>
+          <p:nvPr/>
+        </p:nvCxnSpPr>
+        <p:spPr>
+          <a:xfrm>
+            <a:off x="5279396" y="2157681"/>
+            <a:ext cx="0" cy="1885052"/>
+          </a:xfrm>
+          <a:prstGeom prst="straightConnector1">
+            <a:avLst/>
+          </a:prstGeom>
+          <a:ln>
+            <a:tailEnd type="triangle"/>
+          </a:ln>
+        </p:spPr>
+        <p:style>
+          <a:lnRef idx="2">
+            <a:schemeClr val="dk1"/>
+          </a:lnRef>
+          <a:fillRef idx="0">
+            <a:schemeClr val="dk1"/>
+          </a:fillRef>
+          <a:effectRef idx="1">
+            <a:schemeClr val="dk1"/>
+          </a:effectRef>
+          <a:fontRef idx="minor">
+            <a:schemeClr val="tx1"/>
+          </a:fontRef>
+        </p:style>
+      </p:cxnSp>
+      <p:cxnSp>
+        <p:nvCxnSpPr>
+          <p:cNvPr id="44" name="Straight Arrow Connector 43">
+            <a:extLst>
+              <a:ext uri="{FF2B5EF4-FFF2-40B4-BE49-F238E27FC236}">
+                <a16:creationId xmlns:a16="http://schemas.microsoft.com/office/drawing/2014/main" id="{5ADFE0B6-1732-88F1-7159-5C61D01E925C}"/>
+              </a:ext>
+            </a:extLst>
+          </p:cNvPr>
+          <p:cNvCxnSpPr>
+            <a:cxnSpLocks/>
+          </p:cNvCxnSpPr>
+          <p:nvPr/>
+        </p:nvCxnSpPr>
+        <p:spPr>
+          <a:xfrm>
+            <a:off x="4672020" y="3607931"/>
+            <a:ext cx="0" cy="419287"/>
+          </a:xfrm>
+          <a:prstGeom prst="straightConnector1">
+            <a:avLst/>
+          </a:prstGeom>
+          <a:ln>
+            <a:prstDash val="sysDash"/>
+            <a:tailEnd type="triangle"/>
+          </a:ln>
+        </p:spPr>
+        <p:style>
+          <a:lnRef idx="2">
+            <a:schemeClr val="accent1"/>
+          </a:lnRef>
+          <a:fillRef idx="0">
+            <a:schemeClr val="accent1"/>
+          </a:fillRef>
+          <a:effectRef idx="1">
+            <a:schemeClr val="accent1"/>
+          </a:effectRef>
+          <a:fontRef idx="minor">
+            <a:schemeClr val="tx1"/>
+          </a:fontRef>
+        </p:style>
+      </p:cxnSp>
+      <p:pic>
+        <p:nvPicPr>
+          <p:cNvPr id="46" name="Picture 45">
+            <a:extLst>
+              <a:ext uri="{FF2B5EF4-FFF2-40B4-BE49-F238E27FC236}">
+                <a16:creationId xmlns:a16="http://schemas.microsoft.com/office/drawing/2014/main" id="{CB4E1298-B556-1BDC-5640-FEBCF558393F}"/>
+              </a:ext>
+            </a:extLst>
+          </p:cNvPr>
+          <p:cNvPicPr>
+            <a:picLocks noChangeAspect="1"/>
+          </p:cNvPicPr>
+          <p:nvPr/>
+        </p:nvPicPr>
+        <p:blipFill>
+          <a:blip r:embed="rId2"/>
+          <a:stretch>
+            <a:fillRect/>
+          </a:stretch>
+        </p:blipFill>
+        <p:spPr>
+          <a:xfrm>
+            <a:off x="4539003" y="3648533"/>
+            <a:ext cx="261165" cy="276835"/>
+          </a:xfrm>
+          <a:prstGeom prst="rect">
+            <a:avLst/>
+          </a:prstGeom>
+        </p:spPr>
+      </p:pic>
+      <p:sp>
+        <p:nvSpPr>
+          <p:cNvPr id="47" name="TextBox 46">
+            <a:extLst>
+              <a:ext uri="{FF2B5EF4-FFF2-40B4-BE49-F238E27FC236}">
+                <a16:creationId xmlns:a16="http://schemas.microsoft.com/office/drawing/2014/main" id="{BE63C44E-155B-9BA1-8771-2FEDE300E438}"/>
+              </a:ext>
+            </a:extLst>
+          </p:cNvPr>
+          <p:cNvSpPr txBox="1"/>
+          <p:nvPr/>
+        </p:nvSpPr>
+        <p:spPr>
+          <a:xfrm>
+            <a:off x="4912544" y="2937470"/>
+            <a:ext cx="928254" cy="253916"/>
+          </a:xfrm>
+          <a:prstGeom prst="rect">
+            <a:avLst/>
+          </a:prstGeom>
+          <a:noFill/>
+        </p:spPr>
+        <p:txBody>
+          <a:bodyPr wrap="square" rtlCol="0">
+            <a:spAutoFit/>
+          </a:bodyPr>
+          <a:lstStyle/>
+          <a:p>
+            <a:r>
+              <a:rPr lang="en-US" sz="1050" b="1" dirty="0">
+                <a:solidFill>
+                  <a:schemeClr val="accent2">
+                    <a:lumMod val="75000"/>
+                  </a:schemeClr>
+                </a:solidFill>
+              </a:rPr>
+              <a:t>Sub-thread </a:t>
+            </a:r>
+            <a:endParaRPr lang="en-SG" sz="1050" b="1" dirty="0">
+              <a:solidFill>
+                <a:schemeClr val="accent2">
+                  <a:lumMod val="75000"/>
+                </a:schemeClr>
+              </a:solidFill>
+            </a:endParaRPr>
+          </a:p>
+        </p:txBody>
+      </p:sp>
+      <p:sp>
+        <p:nvSpPr>
+          <p:cNvPr id="48" name="TextBox 47">
+            <a:extLst>
+              <a:ext uri="{FF2B5EF4-FFF2-40B4-BE49-F238E27FC236}">
+                <a16:creationId xmlns:a16="http://schemas.microsoft.com/office/drawing/2014/main" id="{82664086-C091-9FDE-117B-C903F07DE3CB}"/>
+              </a:ext>
+            </a:extLst>
+          </p:cNvPr>
+          <p:cNvSpPr txBox="1"/>
+          <p:nvPr/>
+        </p:nvSpPr>
+        <p:spPr>
+          <a:xfrm>
+            <a:off x="3297627" y="2866413"/>
+            <a:ext cx="928254" cy="415498"/>
+          </a:xfrm>
+          <a:prstGeom prst="rect">
+            <a:avLst/>
+          </a:prstGeom>
+          <a:noFill/>
+        </p:spPr>
+        <p:txBody>
+          <a:bodyPr wrap="square" rtlCol="0">
+            <a:spAutoFit/>
+          </a:bodyPr>
+          <a:lstStyle/>
+          <a:p>
+            <a:r>
+              <a:rPr lang="en-US" sz="1050" b="1" dirty="0">
+                <a:solidFill>
+                  <a:schemeClr val="accent2">
+                    <a:lumMod val="75000"/>
+                  </a:schemeClr>
+                </a:solidFill>
+              </a:rPr>
+              <a:t>New log check loop </a:t>
+            </a:r>
+            <a:endParaRPr lang="en-SG" sz="1050" b="1" dirty="0">
+              <a:solidFill>
+                <a:schemeClr val="accent2">
+                  <a:lumMod val="75000"/>
+                </a:schemeClr>
+              </a:solidFill>
+            </a:endParaRPr>
+          </a:p>
+        </p:txBody>
+      </p:sp>
+      <p:sp>
+        <p:nvSpPr>
+          <p:cNvPr id="49" name="Rectangle 48">
+            <a:extLst>
+              <a:ext uri="{FF2B5EF4-FFF2-40B4-BE49-F238E27FC236}">
+                <a16:creationId xmlns:a16="http://schemas.microsoft.com/office/drawing/2014/main" id="{AD703DAB-FC70-C486-045C-B9F88EAB410D}"/>
+              </a:ext>
+            </a:extLst>
+          </p:cNvPr>
+          <p:cNvSpPr/>
+          <p:nvPr/>
+        </p:nvSpPr>
+        <p:spPr>
+          <a:xfrm>
+            <a:off x="7877962" y="1188429"/>
+            <a:ext cx="1292611" cy="336935"/>
+          </a:xfrm>
+          <a:prstGeom prst="rect">
+            <a:avLst/>
+          </a:prstGeom>
+          <a:solidFill>
+            <a:schemeClr val="accent6">
+              <a:lumMod val="75000"/>
+            </a:schemeClr>
+          </a:solidFill>
+        </p:spPr>
+        <p:style>
+          <a:lnRef idx="2">
+            <a:schemeClr val="accent1">
+              <a:shade val="50000"/>
+            </a:schemeClr>
+          </a:lnRef>
+          <a:fillRef idx="1">
+            <a:schemeClr val="accent1"/>
+          </a:fillRef>
+          <a:effectRef idx="0">
+            <a:schemeClr val="accent1"/>
+          </a:effectRef>
+          <a:fontRef idx="minor">
+            <a:schemeClr val="lt1"/>
+          </a:fontRef>
+        </p:style>
+        <p:txBody>
+          <a:bodyPr rtlCol="0" anchor="ctr"/>
+          <a:lstStyle/>
+          <a:p>
+            <a:pPr algn="ctr"/>
+            <a:r>
+              <a:rPr lang="en-US" sz="1200" dirty="0"/>
+              <a:t>Log Archive Service Init </a:t>
+            </a:r>
+            <a:endParaRPr lang="en-SG" sz="1200" dirty="0"/>
+          </a:p>
+        </p:txBody>
+      </p:sp>
+      <p:cxnSp>
+        <p:nvCxnSpPr>
+          <p:cNvPr id="50" name="Straight Arrow Connector 49">
+            <a:extLst>
+              <a:ext uri="{FF2B5EF4-FFF2-40B4-BE49-F238E27FC236}">
+                <a16:creationId xmlns:a16="http://schemas.microsoft.com/office/drawing/2014/main" id="{4C03E642-0F87-45E5-DADA-A9E439332D23}"/>
+              </a:ext>
+            </a:extLst>
+          </p:cNvPr>
+          <p:cNvCxnSpPr/>
+          <p:nvPr/>
+        </p:nvCxnSpPr>
+        <p:spPr>
+          <a:xfrm flipH="1">
+            <a:off x="8524266" y="1514292"/>
+            <a:ext cx="1" cy="385115"/>
+          </a:xfrm>
+          <a:prstGeom prst="straightConnector1">
+            <a:avLst/>
+          </a:prstGeom>
+          <a:ln>
+            <a:tailEnd type="triangle"/>
+          </a:ln>
+        </p:spPr>
+        <p:style>
+          <a:lnRef idx="2">
+            <a:schemeClr val="dk1"/>
+          </a:lnRef>
+          <a:fillRef idx="0">
+            <a:schemeClr val="dk1"/>
+          </a:fillRef>
+          <a:effectRef idx="1">
+            <a:schemeClr val="dk1"/>
+          </a:effectRef>
+          <a:fontRef idx="minor">
+            <a:schemeClr val="tx1"/>
+          </a:fontRef>
+        </p:style>
+      </p:cxnSp>
+      <p:pic>
+        <p:nvPicPr>
+          <p:cNvPr id="51" name="Picture 50">
+            <a:extLst>
+              <a:ext uri="{FF2B5EF4-FFF2-40B4-BE49-F238E27FC236}">
+                <a16:creationId xmlns:a16="http://schemas.microsoft.com/office/drawing/2014/main" id="{7603F518-6FD8-17CD-53B1-DD5A2470106F}"/>
+              </a:ext>
+            </a:extLst>
+          </p:cNvPr>
+          <p:cNvPicPr>
+            <a:picLocks noChangeAspect="1"/>
+          </p:cNvPicPr>
+          <p:nvPr/>
+        </p:nvPicPr>
+        <p:blipFill>
+          <a:blip r:embed="rId3"/>
+          <a:stretch>
+            <a:fillRect/>
+          </a:stretch>
+        </p:blipFill>
+        <p:spPr>
+          <a:xfrm>
+            <a:off x="9481504" y="1102672"/>
+            <a:ext cx="391132" cy="488914"/>
+          </a:xfrm>
+          <a:prstGeom prst="rect">
+            <a:avLst/>
+          </a:prstGeom>
+        </p:spPr>
+      </p:pic>
+      <p:cxnSp>
+        <p:nvCxnSpPr>
+          <p:cNvPr id="52" name="Straight Arrow Connector 51">
+            <a:extLst>
+              <a:ext uri="{FF2B5EF4-FFF2-40B4-BE49-F238E27FC236}">
+                <a16:creationId xmlns:a16="http://schemas.microsoft.com/office/drawing/2014/main" id="{3FD550CB-D37B-FF2D-FB55-6F002C66346A}"/>
+              </a:ext>
+            </a:extLst>
+          </p:cNvPr>
+          <p:cNvCxnSpPr>
+            <a:cxnSpLocks/>
+            <a:stCxn id="51" idx="1"/>
+          </p:cNvCxnSpPr>
+          <p:nvPr/>
+        </p:nvCxnSpPr>
+        <p:spPr>
+          <a:xfrm flipH="1">
+            <a:off x="9177528" y="1347129"/>
+            <a:ext cx="303976" cy="0"/>
+          </a:xfrm>
+          <a:prstGeom prst="straightConnector1">
+            <a:avLst/>
+          </a:prstGeom>
+          <a:ln>
+            <a:prstDash val="sysDash"/>
+            <a:tailEnd type="triangle"/>
+          </a:ln>
+        </p:spPr>
+        <p:style>
+          <a:lnRef idx="2">
+            <a:schemeClr val="accent1"/>
+          </a:lnRef>
+          <a:fillRef idx="0">
+            <a:schemeClr val="accent1"/>
+          </a:fillRef>
+          <a:effectRef idx="1">
+            <a:schemeClr val="accent1"/>
+          </a:effectRef>
+          <a:fontRef idx="minor">
+            <a:schemeClr val="tx1"/>
+          </a:fontRef>
+        </p:style>
+      </p:cxnSp>
+      <p:sp>
+        <p:nvSpPr>
+          <p:cNvPr id="53" name="TextBox 52">
+            <a:extLst>
+              <a:ext uri="{FF2B5EF4-FFF2-40B4-BE49-F238E27FC236}">
+                <a16:creationId xmlns:a16="http://schemas.microsoft.com/office/drawing/2014/main" id="{8D75903C-9BC8-4322-9031-F3A1DD077D5E}"/>
+              </a:ext>
+            </a:extLst>
+          </p:cNvPr>
+          <p:cNvSpPr txBox="1"/>
+          <p:nvPr/>
+        </p:nvSpPr>
+        <p:spPr>
+          <a:xfrm>
+            <a:off x="9871455" y="1112469"/>
+            <a:ext cx="813841" cy="415498"/>
+          </a:xfrm>
+          <a:prstGeom prst="rect">
+            <a:avLst/>
+          </a:prstGeom>
+          <a:noFill/>
+        </p:spPr>
+        <p:txBody>
+          <a:bodyPr wrap="square" rtlCol="0">
+            <a:spAutoFit/>
+          </a:bodyPr>
+          <a:lstStyle/>
+          <a:p>
+            <a:r>
+              <a:rPr lang="en-US" sz="1050" dirty="0"/>
+              <a:t>Server config  file</a:t>
+            </a:r>
+            <a:endParaRPr lang="en-SG" sz="1050" dirty="0"/>
+          </a:p>
+        </p:txBody>
+      </p:sp>
+      <p:sp>
+        <p:nvSpPr>
+          <p:cNvPr id="54" name="Rectangle 53">
+            <a:extLst>
+              <a:ext uri="{FF2B5EF4-FFF2-40B4-BE49-F238E27FC236}">
+                <a16:creationId xmlns:a16="http://schemas.microsoft.com/office/drawing/2014/main" id="{202118A9-72D9-CCC0-655D-02982240C2E6}"/>
+              </a:ext>
+            </a:extLst>
+          </p:cNvPr>
+          <p:cNvSpPr/>
+          <p:nvPr/>
+        </p:nvSpPr>
+        <p:spPr>
+          <a:xfrm>
+            <a:off x="7892152" y="1888334"/>
+            <a:ext cx="1292611" cy="270829"/>
+          </a:xfrm>
+          <a:prstGeom prst="rect">
+            <a:avLst/>
+          </a:prstGeom>
+          <a:solidFill>
+            <a:schemeClr val="accent6">
+              <a:lumMod val="75000"/>
+            </a:schemeClr>
+          </a:solidFill>
+        </p:spPr>
+        <p:style>
+          <a:lnRef idx="2">
+            <a:schemeClr val="accent1">
+              <a:shade val="50000"/>
+            </a:schemeClr>
+          </a:lnRef>
+          <a:fillRef idx="1">
+            <a:schemeClr val="accent1"/>
+          </a:fillRef>
+          <a:effectRef idx="0">
+            <a:schemeClr val="accent1"/>
+          </a:effectRef>
+          <a:fontRef idx="minor">
+            <a:schemeClr val="lt1"/>
+          </a:fontRef>
+        </p:style>
+        <p:txBody>
+          <a:bodyPr rtlCol="0" anchor="ctr"/>
+          <a:lstStyle/>
+          <a:p>
+            <a:pPr algn="ctr"/>
+            <a:r>
+              <a:rPr lang="en-US" sz="1200" dirty="0"/>
+              <a:t>Agent manager </a:t>
+            </a:r>
+            <a:endParaRPr lang="en-SG" sz="1200" dirty="0"/>
+          </a:p>
+        </p:txBody>
+      </p:sp>
+      <p:sp>
+        <p:nvSpPr>
+          <p:cNvPr id="55" name="TextBox 54">
+            <a:extLst>
+              <a:ext uri="{FF2B5EF4-FFF2-40B4-BE49-F238E27FC236}">
+                <a16:creationId xmlns:a16="http://schemas.microsoft.com/office/drawing/2014/main" id="{D4C72711-9726-C359-30A3-FAD7FE352882}"/>
+              </a:ext>
+            </a:extLst>
+          </p:cNvPr>
+          <p:cNvSpPr txBox="1"/>
+          <p:nvPr/>
+        </p:nvSpPr>
+        <p:spPr>
+          <a:xfrm>
+            <a:off x="8524266" y="1622086"/>
+            <a:ext cx="928254" cy="253916"/>
+          </a:xfrm>
+          <a:prstGeom prst="rect">
+            <a:avLst/>
+          </a:prstGeom>
+          <a:noFill/>
+        </p:spPr>
+        <p:txBody>
+          <a:bodyPr wrap="square" rtlCol="0">
+            <a:spAutoFit/>
+          </a:bodyPr>
+          <a:lstStyle/>
+          <a:p>
+            <a:r>
+              <a:rPr lang="en-US" sz="1050" b="1" dirty="0">
+                <a:solidFill>
+                  <a:schemeClr val="accent6">
+                    <a:lumMod val="75000"/>
+                  </a:schemeClr>
+                </a:solidFill>
+              </a:rPr>
+              <a:t>Main thread </a:t>
+            </a:r>
+            <a:endParaRPr lang="en-SG" sz="1050" b="1" dirty="0">
+              <a:solidFill>
+                <a:schemeClr val="accent6">
+                  <a:lumMod val="75000"/>
+                </a:schemeClr>
+              </a:solidFill>
+            </a:endParaRPr>
+          </a:p>
+        </p:txBody>
+      </p:sp>
+      <p:cxnSp>
+        <p:nvCxnSpPr>
+          <p:cNvPr id="56" name="Straight Arrow Connector 55">
+            <a:extLst>
+              <a:ext uri="{FF2B5EF4-FFF2-40B4-BE49-F238E27FC236}">
+                <a16:creationId xmlns:a16="http://schemas.microsoft.com/office/drawing/2014/main" id="{E73567CA-D82B-6523-9B48-B12D02E3086E}"/>
+              </a:ext>
+            </a:extLst>
+          </p:cNvPr>
+          <p:cNvCxnSpPr>
+            <a:cxnSpLocks/>
+          </p:cNvCxnSpPr>
+          <p:nvPr/>
+        </p:nvCxnSpPr>
+        <p:spPr>
+          <a:xfrm flipH="1">
+            <a:off x="9184763" y="2023748"/>
+            <a:ext cx="303976" cy="0"/>
+          </a:xfrm>
+          <a:prstGeom prst="straightConnector1">
+            <a:avLst/>
+          </a:prstGeom>
+          <a:ln>
+            <a:prstDash val="sysDash"/>
+            <a:tailEnd type="triangle"/>
+          </a:ln>
+        </p:spPr>
+        <p:style>
+          <a:lnRef idx="2">
+            <a:schemeClr val="accent1"/>
+          </a:lnRef>
+          <a:fillRef idx="0">
+            <a:schemeClr val="accent1"/>
+          </a:fillRef>
+          <a:effectRef idx="1">
+            <a:schemeClr val="accent1"/>
+          </a:effectRef>
+          <a:fontRef idx="minor">
+            <a:schemeClr val="tx1"/>
+          </a:fontRef>
+        </p:style>
+      </p:cxnSp>
+      <p:pic>
+        <p:nvPicPr>
+          <p:cNvPr id="57" name="Picture 56">
+            <a:extLst>
+              <a:ext uri="{FF2B5EF4-FFF2-40B4-BE49-F238E27FC236}">
+                <a16:creationId xmlns:a16="http://schemas.microsoft.com/office/drawing/2014/main" id="{B8DFA6F9-A8DB-4D66-B1D2-E128427B5016}"/>
+              </a:ext>
+            </a:extLst>
+          </p:cNvPr>
+          <p:cNvPicPr>
+            <a:picLocks noChangeAspect="1"/>
+          </p:cNvPicPr>
+          <p:nvPr/>
+        </p:nvPicPr>
+        <p:blipFill>
+          <a:blip r:embed="rId3"/>
+          <a:stretch>
+            <a:fillRect/>
+          </a:stretch>
+        </p:blipFill>
+        <p:spPr>
+          <a:xfrm>
+            <a:off x="9488739" y="1746352"/>
+            <a:ext cx="391132" cy="488914"/>
+          </a:xfrm>
+          <a:prstGeom prst="rect">
+            <a:avLst/>
+          </a:prstGeom>
+        </p:spPr>
+      </p:pic>
+      <p:sp>
+        <p:nvSpPr>
+          <p:cNvPr id="58" name="TextBox 57">
+            <a:extLst>
+              <a:ext uri="{FF2B5EF4-FFF2-40B4-BE49-F238E27FC236}">
+                <a16:creationId xmlns:a16="http://schemas.microsoft.com/office/drawing/2014/main" id="{112DE8E2-D0C2-67D2-8ACC-6D157CE14A59}"/>
+              </a:ext>
+            </a:extLst>
+          </p:cNvPr>
+          <p:cNvSpPr txBox="1"/>
+          <p:nvPr/>
+        </p:nvSpPr>
+        <p:spPr>
+          <a:xfrm>
+            <a:off x="9863116" y="1827365"/>
+            <a:ext cx="813841" cy="415498"/>
+          </a:xfrm>
+          <a:prstGeom prst="rect">
+            <a:avLst/>
+          </a:prstGeom>
+          <a:noFill/>
+        </p:spPr>
+        <p:txBody>
+          <a:bodyPr wrap="square" rtlCol="0">
+            <a:spAutoFit/>
+          </a:bodyPr>
+          <a:lstStyle/>
+          <a:p>
+            <a:r>
+              <a:rPr lang="en-US" sz="1050" dirty="0"/>
+              <a:t>User Config file </a:t>
+            </a:r>
+            <a:endParaRPr lang="en-SG" sz="1050" dirty="0"/>
+          </a:p>
+        </p:txBody>
+      </p:sp>
+      <p:sp>
+        <p:nvSpPr>
+          <p:cNvPr id="59" name="Rectangle 58">
+            <a:extLst>
+              <a:ext uri="{FF2B5EF4-FFF2-40B4-BE49-F238E27FC236}">
+                <a16:creationId xmlns:a16="http://schemas.microsoft.com/office/drawing/2014/main" id="{E5D11581-6B52-B8F0-E935-8FB8EA6139D0}"/>
+              </a:ext>
+            </a:extLst>
+          </p:cNvPr>
+          <p:cNvSpPr/>
+          <p:nvPr/>
+        </p:nvSpPr>
+        <p:spPr>
+          <a:xfrm>
+            <a:off x="7877962" y="2595584"/>
+            <a:ext cx="1000864" cy="270829"/>
+          </a:xfrm>
+          <a:prstGeom prst="rect">
+            <a:avLst/>
+          </a:prstGeom>
+          <a:solidFill>
+            <a:schemeClr val="accent6">
+              <a:lumMod val="75000"/>
+            </a:schemeClr>
+          </a:solidFill>
+        </p:spPr>
+        <p:style>
+          <a:lnRef idx="2">
+            <a:schemeClr val="accent1">
+              <a:shade val="50000"/>
+            </a:schemeClr>
+          </a:lnRef>
+          <a:fillRef idx="1">
+            <a:schemeClr val="accent1"/>
+          </a:fillRef>
+          <a:effectRef idx="0">
+            <a:schemeClr val="accent1"/>
+          </a:effectRef>
+          <a:fontRef idx="minor">
+            <a:schemeClr val="lt1"/>
+          </a:fontRef>
+        </p:style>
+        <p:txBody>
+          <a:bodyPr rtlCol="0" anchor="ctr"/>
+          <a:lstStyle/>
+          <a:p>
+            <a:pPr algn="ctr"/>
+            <a:r>
+              <a:rPr lang="en-US" sz="1200" dirty="0"/>
+              <a:t>FTP Server </a:t>
+            </a:r>
+            <a:endParaRPr lang="en-SG" sz="1200" dirty="0"/>
+          </a:p>
+        </p:txBody>
+      </p:sp>
+      <p:cxnSp>
+        <p:nvCxnSpPr>
+          <p:cNvPr id="60" name="Straight Arrow Connector 59">
+            <a:extLst>
+              <a:ext uri="{FF2B5EF4-FFF2-40B4-BE49-F238E27FC236}">
+                <a16:creationId xmlns:a16="http://schemas.microsoft.com/office/drawing/2014/main" id="{A02EB35C-3168-7CA7-65E4-1865AE3CDBF3}"/>
+              </a:ext>
+            </a:extLst>
+          </p:cNvPr>
+          <p:cNvCxnSpPr>
+            <a:cxnSpLocks/>
+            <a:endCxn id="59" idx="0"/>
+          </p:cNvCxnSpPr>
+          <p:nvPr/>
+        </p:nvCxnSpPr>
+        <p:spPr>
+          <a:xfrm flipH="1">
+            <a:off x="8378394" y="2153327"/>
+            <a:ext cx="1" cy="442257"/>
+          </a:xfrm>
+          <a:prstGeom prst="straightConnector1">
+            <a:avLst/>
+          </a:prstGeom>
+          <a:ln>
+            <a:tailEnd type="triangle"/>
+          </a:ln>
+        </p:spPr>
+        <p:style>
+          <a:lnRef idx="2">
+            <a:schemeClr val="dk1"/>
+          </a:lnRef>
+          <a:fillRef idx="0">
+            <a:schemeClr val="dk1"/>
+          </a:fillRef>
+          <a:effectRef idx="1">
+            <a:schemeClr val="dk1"/>
+          </a:effectRef>
+          <a:fontRef idx="minor">
+            <a:schemeClr val="tx1"/>
+          </a:fontRef>
+        </p:style>
+      </p:cxnSp>
+      <p:cxnSp>
+        <p:nvCxnSpPr>
+          <p:cNvPr id="63" name="Connector: Elbow 62">
+            <a:extLst>
+              <a:ext uri="{FF2B5EF4-FFF2-40B4-BE49-F238E27FC236}">
+                <a16:creationId xmlns:a16="http://schemas.microsoft.com/office/drawing/2014/main" id="{3A40EE42-642D-7A91-BD2D-208876400D37}"/>
+              </a:ext>
+            </a:extLst>
+          </p:cNvPr>
+          <p:cNvCxnSpPr>
+            <a:stCxn id="41" idx="3"/>
+            <a:endCxn id="59" idx="1"/>
+          </p:cNvCxnSpPr>
+          <p:nvPr/>
+        </p:nvCxnSpPr>
+        <p:spPr>
+          <a:xfrm flipV="1">
+            <a:off x="5376671" y="2730999"/>
+            <a:ext cx="2501291" cy="1450151"/>
+          </a:xfrm>
+          <a:prstGeom prst="bentConnector3">
+            <a:avLst/>
+          </a:prstGeom>
+          <a:ln>
+            <a:prstDash val="sysDash"/>
+            <a:tailEnd type="triangle"/>
+          </a:ln>
+        </p:spPr>
+        <p:style>
+          <a:lnRef idx="2">
+            <a:schemeClr val="accent1"/>
+          </a:lnRef>
+          <a:fillRef idx="0">
+            <a:schemeClr val="accent1"/>
+          </a:fillRef>
+          <a:effectRef idx="1">
+            <a:schemeClr val="accent1"/>
+          </a:effectRef>
+          <a:fontRef idx="minor">
+            <a:schemeClr val="tx1"/>
+          </a:fontRef>
+        </p:style>
+      </p:cxnSp>
+      <p:pic>
+        <p:nvPicPr>
+          <p:cNvPr id="64" name="Picture 63">
+            <a:extLst>
+              <a:ext uri="{FF2B5EF4-FFF2-40B4-BE49-F238E27FC236}">
+                <a16:creationId xmlns:a16="http://schemas.microsoft.com/office/drawing/2014/main" id="{0C39788A-A20D-F1B5-3FFD-CA89543F23B6}"/>
+              </a:ext>
+            </a:extLst>
+          </p:cNvPr>
+          <p:cNvPicPr>
+            <a:picLocks noChangeAspect="1"/>
+          </p:cNvPicPr>
+          <p:nvPr/>
+        </p:nvPicPr>
+        <p:blipFill>
+          <a:blip r:embed="rId2"/>
+          <a:stretch>
+            <a:fillRect/>
+          </a:stretch>
+        </p:blipFill>
+        <p:spPr>
+          <a:xfrm>
+            <a:off x="6477519" y="3179239"/>
+            <a:ext cx="261165" cy="276835"/>
+          </a:xfrm>
+          <a:prstGeom prst="rect">
+            <a:avLst/>
+          </a:prstGeom>
+        </p:spPr>
+      </p:pic>
+      <p:sp>
+        <p:nvSpPr>
+          <p:cNvPr id="65" name="Rectangle 64">
+            <a:extLst>
+              <a:ext uri="{FF2B5EF4-FFF2-40B4-BE49-F238E27FC236}">
+                <a16:creationId xmlns:a16="http://schemas.microsoft.com/office/drawing/2014/main" id="{4F815B60-82AC-DF5D-4ED9-C9B8B3FD490E}"/>
+              </a:ext>
+            </a:extLst>
+          </p:cNvPr>
+          <p:cNvSpPr/>
+          <p:nvPr/>
+        </p:nvSpPr>
+        <p:spPr>
+          <a:xfrm>
+            <a:off x="7773724" y="3642583"/>
+            <a:ext cx="482420" cy="408331"/>
+          </a:xfrm>
+          <a:prstGeom prst="rect">
+            <a:avLst/>
+          </a:prstGeom>
+          <a:solidFill>
+            <a:schemeClr val="bg2"/>
+          </a:solidFill>
+        </p:spPr>
+        <p:style>
+          <a:lnRef idx="2">
+            <a:schemeClr val="accent1">
+              <a:shade val="15000"/>
+            </a:schemeClr>
+          </a:lnRef>
+          <a:fillRef idx="1">
+            <a:schemeClr val="accent1"/>
+          </a:fillRef>
+          <a:effectRef idx="0">
+            <a:schemeClr val="accent1"/>
+          </a:effectRef>
+          <a:fontRef idx="minor">
+            <a:schemeClr val="lt1"/>
+          </a:fontRef>
+        </p:style>
+        <p:txBody>
+          <a:bodyPr rtlCol="0" anchor="ctr"/>
+          <a:lstStyle/>
+          <a:p>
+            <a:pPr algn="ctr"/>
+            <a:endParaRPr lang="en-SG"/>
+          </a:p>
+        </p:txBody>
+      </p:sp>
+      <p:pic>
+        <p:nvPicPr>
+          <p:cNvPr id="66" name="Picture 65">
+            <a:extLst>
+              <a:ext uri="{FF2B5EF4-FFF2-40B4-BE49-F238E27FC236}">
+                <a16:creationId xmlns:a16="http://schemas.microsoft.com/office/drawing/2014/main" id="{6FF5BB39-AA4A-48DB-44A5-066129EBCFEA}"/>
+              </a:ext>
+            </a:extLst>
+          </p:cNvPr>
+          <p:cNvPicPr>
+            <a:picLocks noChangeAspect="1"/>
+          </p:cNvPicPr>
+          <p:nvPr/>
+        </p:nvPicPr>
+        <p:blipFill>
+          <a:blip r:embed="rId2"/>
+          <a:stretch>
+            <a:fillRect/>
+          </a:stretch>
+        </p:blipFill>
+        <p:spPr>
+          <a:xfrm>
+            <a:off x="7921886" y="3690969"/>
+            <a:ext cx="261165" cy="276835"/>
+          </a:xfrm>
+          <a:prstGeom prst="rect">
+            <a:avLst/>
+          </a:prstGeom>
+        </p:spPr>
+      </p:pic>
+      <p:pic>
+        <p:nvPicPr>
+          <p:cNvPr id="67" name="Picture 66">
+            <a:extLst>
+              <a:ext uri="{FF2B5EF4-FFF2-40B4-BE49-F238E27FC236}">
+                <a16:creationId xmlns:a16="http://schemas.microsoft.com/office/drawing/2014/main" id="{C11D0E90-FDD4-9C31-60B4-4B2A434C0A2B}"/>
+              </a:ext>
+            </a:extLst>
+          </p:cNvPr>
+          <p:cNvPicPr>
+            <a:picLocks noChangeAspect="1"/>
+          </p:cNvPicPr>
+          <p:nvPr/>
+        </p:nvPicPr>
+        <p:blipFill>
+          <a:blip r:embed="rId2"/>
+          <a:stretch>
+            <a:fillRect/>
+          </a:stretch>
+        </p:blipFill>
+        <p:spPr>
+          <a:xfrm>
+            <a:off x="7827850" y="3739355"/>
+            <a:ext cx="261165" cy="276835"/>
+          </a:xfrm>
+          <a:prstGeom prst="rect">
+            <a:avLst/>
+          </a:prstGeom>
+        </p:spPr>
+      </p:pic>
+      <p:sp>
+        <p:nvSpPr>
+          <p:cNvPr id="70" name="Rectangle 69">
+            <a:extLst>
+              <a:ext uri="{FF2B5EF4-FFF2-40B4-BE49-F238E27FC236}">
+                <a16:creationId xmlns:a16="http://schemas.microsoft.com/office/drawing/2014/main" id="{5B16D855-F035-CB10-6E86-DCE0037C7398}"/>
+              </a:ext>
+            </a:extLst>
+          </p:cNvPr>
+          <p:cNvSpPr/>
+          <p:nvPr/>
+        </p:nvSpPr>
+        <p:spPr>
+          <a:xfrm>
+            <a:off x="8398443" y="3637117"/>
+            <a:ext cx="482420" cy="408331"/>
+          </a:xfrm>
+          <a:prstGeom prst="rect">
+            <a:avLst/>
+          </a:prstGeom>
+          <a:solidFill>
+            <a:schemeClr val="bg2"/>
+          </a:solidFill>
+        </p:spPr>
+        <p:style>
+          <a:lnRef idx="2">
+            <a:schemeClr val="accent1">
+              <a:shade val="15000"/>
+            </a:schemeClr>
+          </a:lnRef>
+          <a:fillRef idx="1">
+            <a:schemeClr val="accent1"/>
+          </a:fillRef>
+          <a:effectRef idx="0">
+            <a:schemeClr val="accent1"/>
+          </a:effectRef>
+          <a:fontRef idx="minor">
+            <a:schemeClr val="lt1"/>
+          </a:fontRef>
+        </p:style>
+        <p:txBody>
+          <a:bodyPr rtlCol="0" anchor="ctr"/>
+          <a:lstStyle/>
+          <a:p>
+            <a:pPr algn="ctr"/>
+            <a:endParaRPr lang="en-SG"/>
+          </a:p>
+        </p:txBody>
+      </p:sp>
+      <p:pic>
+        <p:nvPicPr>
+          <p:cNvPr id="71" name="Picture 70">
+            <a:extLst>
+              <a:ext uri="{FF2B5EF4-FFF2-40B4-BE49-F238E27FC236}">
+                <a16:creationId xmlns:a16="http://schemas.microsoft.com/office/drawing/2014/main" id="{681AE601-4EED-53A3-E4D4-4FF8EE7BF324}"/>
+              </a:ext>
+            </a:extLst>
+          </p:cNvPr>
+          <p:cNvPicPr>
+            <a:picLocks noChangeAspect="1"/>
+          </p:cNvPicPr>
+          <p:nvPr/>
+        </p:nvPicPr>
+        <p:blipFill>
+          <a:blip r:embed="rId2"/>
+          <a:stretch>
+            <a:fillRect/>
+          </a:stretch>
+        </p:blipFill>
+        <p:spPr>
+          <a:xfrm>
+            <a:off x="8546605" y="3685503"/>
+            <a:ext cx="261165" cy="276835"/>
+          </a:xfrm>
+          <a:prstGeom prst="rect">
+            <a:avLst/>
+          </a:prstGeom>
+        </p:spPr>
+      </p:pic>
+      <p:pic>
+        <p:nvPicPr>
+          <p:cNvPr id="72" name="Picture 71">
+            <a:extLst>
+              <a:ext uri="{FF2B5EF4-FFF2-40B4-BE49-F238E27FC236}">
+                <a16:creationId xmlns:a16="http://schemas.microsoft.com/office/drawing/2014/main" id="{6C18E292-4DAB-6FE4-0F42-A6D8EBAC988A}"/>
+              </a:ext>
+            </a:extLst>
+          </p:cNvPr>
+          <p:cNvPicPr>
+            <a:picLocks noChangeAspect="1"/>
+          </p:cNvPicPr>
+          <p:nvPr/>
+        </p:nvPicPr>
+        <p:blipFill>
+          <a:blip r:embed="rId2"/>
+          <a:stretch>
+            <a:fillRect/>
+          </a:stretch>
+        </p:blipFill>
+        <p:spPr>
+          <a:xfrm>
+            <a:off x="8452569" y="3733889"/>
+            <a:ext cx="261165" cy="276835"/>
+          </a:xfrm>
+          <a:prstGeom prst="rect">
+            <a:avLst/>
+          </a:prstGeom>
+        </p:spPr>
+      </p:pic>
+      <p:sp>
+        <p:nvSpPr>
+          <p:cNvPr id="73" name="TextBox 72">
+            <a:extLst>
+              <a:ext uri="{FF2B5EF4-FFF2-40B4-BE49-F238E27FC236}">
+                <a16:creationId xmlns:a16="http://schemas.microsoft.com/office/drawing/2014/main" id="{02758C61-C566-91E2-D87F-CF9D86CE6017}"/>
+              </a:ext>
+            </a:extLst>
+          </p:cNvPr>
+          <p:cNvSpPr txBox="1"/>
+          <p:nvPr/>
+        </p:nvSpPr>
+        <p:spPr>
+          <a:xfrm>
+            <a:off x="7692242" y="4157745"/>
+            <a:ext cx="1558640" cy="253916"/>
+          </a:xfrm>
+          <a:prstGeom prst="rect">
+            <a:avLst/>
+          </a:prstGeom>
+          <a:noFill/>
+        </p:spPr>
+        <p:txBody>
+          <a:bodyPr wrap="square" rtlCol="0">
+            <a:spAutoFit/>
+          </a:bodyPr>
+          <a:lstStyle/>
+          <a:p>
+            <a:r>
+              <a:rPr lang="en-US" sz="1050" b="1" dirty="0"/>
+              <a:t>Server log storage </a:t>
+            </a:r>
+            <a:endParaRPr lang="en-SG" sz="1050" b="1" dirty="0"/>
+          </a:p>
+        </p:txBody>
+      </p:sp>
+      <p:cxnSp>
+        <p:nvCxnSpPr>
+          <p:cNvPr id="74" name="Straight Arrow Connector 73">
+            <a:extLst>
+              <a:ext uri="{FF2B5EF4-FFF2-40B4-BE49-F238E27FC236}">
+                <a16:creationId xmlns:a16="http://schemas.microsoft.com/office/drawing/2014/main" id="{FDDD5643-1B95-8200-53D9-758470965901}"/>
+              </a:ext>
+            </a:extLst>
+          </p:cNvPr>
+          <p:cNvCxnSpPr>
+            <a:cxnSpLocks/>
+          </p:cNvCxnSpPr>
+          <p:nvPr/>
+        </p:nvCxnSpPr>
+        <p:spPr>
+          <a:xfrm>
+            <a:off x="8089015" y="2884408"/>
+            <a:ext cx="0" cy="723523"/>
+          </a:xfrm>
+          <a:prstGeom prst="straightConnector1">
+            <a:avLst/>
+          </a:prstGeom>
+          <a:ln>
+            <a:prstDash val="sysDash"/>
+            <a:tailEnd type="triangle"/>
+          </a:ln>
+        </p:spPr>
+        <p:style>
+          <a:lnRef idx="2">
+            <a:schemeClr val="accent1"/>
+          </a:lnRef>
+          <a:fillRef idx="0">
+            <a:schemeClr val="accent1"/>
+          </a:fillRef>
+          <a:effectRef idx="1">
+            <a:schemeClr val="accent1"/>
+          </a:effectRef>
+          <a:fontRef idx="minor">
+            <a:schemeClr val="tx1"/>
+          </a:fontRef>
+        </p:style>
+      </p:cxnSp>
+      <p:pic>
+        <p:nvPicPr>
+          <p:cNvPr id="76" name="Picture 75">
+            <a:extLst>
+              <a:ext uri="{FF2B5EF4-FFF2-40B4-BE49-F238E27FC236}">
+                <a16:creationId xmlns:a16="http://schemas.microsoft.com/office/drawing/2014/main" id="{189F491F-C939-985A-50EB-EDAB2E5180E2}"/>
+              </a:ext>
+            </a:extLst>
+          </p:cNvPr>
+          <p:cNvPicPr>
+            <a:picLocks noChangeAspect="1"/>
+          </p:cNvPicPr>
+          <p:nvPr/>
+        </p:nvPicPr>
+        <p:blipFill>
+          <a:blip r:embed="rId2"/>
+          <a:stretch>
+            <a:fillRect/>
+          </a:stretch>
+        </p:blipFill>
+        <p:spPr>
+          <a:xfrm>
+            <a:off x="7936470" y="3040821"/>
+            <a:ext cx="261165" cy="276835"/>
+          </a:xfrm>
+          <a:prstGeom prst="rect">
+            <a:avLst/>
+          </a:prstGeom>
+        </p:spPr>
+      </p:pic>
+      <p:sp>
+        <p:nvSpPr>
+          <p:cNvPr id="78" name="Rectangle 77">
+            <a:extLst>
+              <a:ext uri="{FF2B5EF4-FFF2-40B4-BE49-F238E27FC236}">
+                <a16:creationId xmlns:a16="http://schemas.microsoft.com/office/drawing/2014/main" id="{7397C8B8-401A-84F1-0356-6873DD9071E4}"/>
+              </a:ext>
+            </a:extLst>
+          </p:cNvPr>
+          <p:cNvSpPr/>
+          <p:nvPr/>
+        </p:nvSpPr>
+        <p:spPr>
+          <a:xfrm>
+            <a:off x="9029027" y="3107226"/>
+            <a:ext cx="1350223" cy="391043"/>
+          </a:xfrm>
+          <a:prstGeom prst="rect">
+            <a:avLst/>
+          </a:prstGeom>
+          <a:solidFill>
+            <a:schemeClr val="accent6">
+              <a:lumMod val="75000"/>
+            </a:schemeClr>
+          </a:solidFill>
+        </p:spPr>
+        <p:style>
+          <a:lnRef idx="2">
+            <a:schemeClr val="accent1">
+              <a:shade val="50000"/>
+            </a:schemeClr>
+          </a:lnRef>
+          <a:fillRef idx="1">
+            <a:schemeClr val="accent1"/>
+          </a:fillRef>
+          <a:effectRef idx="0">
+            <a:schemeClr val="accent1"/>
+          </a:effectRef>
+          <a:fontRef idx="minor">
+            <a:schemeClr val="lt1"/>
+          </a:fontRef>
+        </p:style>
+        <p:txBody>
+          <a:bodyPr rtlCol="0" anchor="ctr"/>
+          <a:lstStyle/>
+          <a:p>
+            <a:pPr algn="ctr"/>
+            <a:r>
+              <a:rPr lang="en-US" sz="1200" dirty="0"/>
+              <a:t>Log directory tree generator</a:t>
+            </a:r>
+            <a:endParaRPr lang="en-SG" sz="1200" dirty="0"/>
+          </a:p>
+        </p:txBody>
+      </p:sp>
+      <p:cxnSp>
+        <p:nvCxnSpPr>
+          <p:cNvPr id="79" name="Straight Arrow Connector 78">
+            <a:extLst>
+              <a:ext uri="{FF2B5EF4-FFF2-40B4-BE49-F238E27FC236}">
+                <a16:creationId xmlns:a16="http://schemas.microsoft.com/office/drawing/2014/main" id="{5E80CB5E-9709-1031-652F-4E8A8735F026}"/>
+              </a:ext>
+            </a:extLst>
+          </p:cNvPr>
+          <p:cNvCxnSpPr>
+            <a:cxnSpLocks/>
+          </p:cNvCxnSpPr>
+          <p:nvPr/>
+        </p:nvCxnSpPr>
+        <p:spPr>
+          <a:xfrm>
+            <a:off x="9082501" y="2177213"/>
+            <a:ext cx="0" cy="385515"/>
+          </a:xfrm>
+          <a:prstGeom prst="straightConnector1">
+            <a:avLst/>
+          </a:prstGeom>
+          <a:ln>
+            <a:tailEnd type="triangle"/>
+          </a:ln>
+        </p:spPr>
+        <p:style>
+          <a:lnRef idx="2">
+            <a:schemeClr val="dk1"/>
+          </a:lnRef>
+          <a:fillRef idx="0">
+            <a:schemeClr val="dk1"/>
+          </a:fillRef>
+          <a:effectRef idx="1">
+            <a:schemeClr val="dk1"/>
+          </a:effectRef>
+          <a:fontRef idx="minor">
+            <a:schemeClr val="tx1"/>
+          </a:fontRef>
+        </p:style>
+      </p:cxnSp>
+      <p:sp>
+        <p:nvSpPr>
+          <p:cNvPr id="81" name="TextBox 80">
+            <a:extLst>
+              <a:ext uri="{FF2B5EF4-FFF2-40B4-BE49-F238E27FC236}">
+                <a16:creationId xmlns:a16="http://schemas.microsoft.com/office/drawing/2014/main" id="{1DBE606A-644C-2C60-E31C-6AEC76A55D69}"/>
+              </a:ext>
+            </a:extLst>
+          </p:cNvPr>
+          <p:cNvSpPr txBox="1"/>
+          <p:nvPr/>
+        </p:nvSpPr>
+        <p:spPr>
+          <a:xfrm>
+            <a:off x="9058853" y="2284917"/>
+            <a:ext cx="928254" cy="253916"/>
+          </a:xfrm>
+          <a:prstGeom prst="rect">
+            <a:avLst/>
+          </a:prstGeom>
+          <a:noFill/>
+        </p:spPr>
+        <p:txBody>
+          <a:bodyPr wrap="square" rtlCol="0">
+            <a:spAutoFit/>
+          </a:bodyPr>
+          <a:lstStyle/>
+          <a:p>
+            <a:r>
+              <a:rPr lang="en-US" sz="1050" b="1" dirty="0">
+                <a:solidFill>
+                  <a:schemeClr val="accent6">
+                    <a:lumMod val="75000"/>
+                  </a:schemeClr>
+                </a:solidFill>
+              </a:rPr>
+              <a:t>Sub-thread</a:t>
+            </a:r>
+            <a:r>
+              <a:rPr lang="en-US" sz="1050" b="1" dirty="0">
+                <a:solidFill>
+                  <a:schemeClr val="accent2">
+                    <a:lumMod val="75000"/>
+                  </a:schemeClr>
+                </a:solidFill>
+              </a:rPr>
+              <a:t> </a:t>
+            </a:r>
+            <a:endParaRPr lang="en-SG" sz="1050" b="1" dirty="0">
+              <a:solidFill>
+                <a:schemeClr val="accent2">
+                  <a:lumMod val="75000"/>
+                </a:schemeClr>
+              </a:solidFill>
+            </a:endParaRPr>
+          </a:p>
+        </p:txBody>
+      </p:sp>
+      <p:sp>
+        <p:nvSpPr>
+          <p:cNvPr id="82" name="Rectangle 81">
+            <a:extLst>
+              <a:ext uri="{FF2B5EF4-FFF2-40B4-BE49-F238E27FC236}">
+                <a16:creationId xmlns:a16="http://schemas.microsoft.com/office/drawing/2014/main" id="{906EE6A2-D084-EECE-CE24-29E19EB65D6A}"/>
+              </a:ext>
+            </a:extLst>
+          </p:cNvPr>
+          <p:cNvSpPr/>
+          <p:nvPr/>
+        </p:nvSpPr>
+        <p:spPr>
+          <a:xfrm>
+            <a:off x="9022547" y="2592039"/>
+            <a:ext cx="1356705" cy="270829"/>
+          </a:xfrm>
+          <a:prstGeom prst="rect">
+            <a:avLst/>
+          </a:prstGeom>
+          <a:solidFill>
+            <a:schemeClr val="accent6">
+              <a:lumMod val="75000"/>
+            </a:schemeClr>
+          </a:solidFill>
+        </p:spPr>
+        <p:style>
+          <a:lnRef idx="2">
+            <a:schemeClr val="accent1">
+              <a:shade val="50000"/>
+            </a:schemeClr>
+          </a:lnRef>
+          <a:fillRef idx="1">
+            <a:schemeClr val="accent1"/>
+          </a:fillRef>
+          <a:effectRef idx="0">
+            <a:schemeClr val="accent1"/>
+          </a:effectRef>
+          <a:fontRef idx="minor">
+            <a:schemeClr val="lt1"/>
+          </a:fontRef>
+        </p:style>
+        <p:txBody>
+          <a:bodyPr rtlCol="0" anchor="ctr"/>
+          <a:lstStyle/>
+          <a:p>
+            <a:pPr algn="ctr"/>
+            <a:r>
+              <a:rPr lang="en-US" sz="1200" dirty="0"/>
+              <a:t>Web host module </a:t>
+            </a:r>
+            <a:endParaRPr lang="en-SG" sz="1200" dirty="0"/>
+          </a:p>
+        </p:txBody>
+      </p:sp>
+      <p:cxnSp>
+        <p:nvCxnSpPr>
+          <p:cNvPr id="84" name="Connector: Elbow 83">
+            <a:extLst>
+              <a:ext uri="{FF2B5EF4-FFF2-40B4-BE49-F238E27FC236}">
+                <a16:creationId xmlns:a16="http://schemas.microsoft.com/office/drawing/2014/main" id="{624110EF-0E05-0F1F-C594-46D8E7C8A911}"/>
+              </a:ext>
+            </a:extLst>
+          </p:cNvPr>
+          <p:cNvCxnSpPr>
+            <a:cxnSpLocks/>
+            <a:stCxn id="68" idx="0"/>
+            <a:endCxn id="78" idx="1"/>
+          </p:cNvCxnSpPr>
+          <p:nvPr/>
+        </p:nvCxnSpPr>
+        <p:spPr>
+          <a:xfrm rot="5400000" flipH="1" flipV="1">
+            <a:off x="8566218" y="3112772"/>
+            <a:ext cx="272832" cy="652785"/>
+          </a:xfrm>
+          <a:prstGeom prst="bentConnector2">
+            <a:avLst/>
+          </a:prstGeom>
+          <a:ln>
+            <a:prstDash val="sysDash"/>
+            <a:tailEnd type="triangle"/>
+          </a:ln>
+        </p:spPr>
+        <p:style>
+          <a:lnRef idx="2">
+            <a:schemeClr val="accent1"/>
+          </a:lnRef>
+          <a:fillRef idx="0">
+            <a:schemeClr val="accent1"/>
+          </a:fillRef>
+          <a:effectRef idx="1">
+            <a:schemeClr val="accent1"/>
+          </a:effectRef>
+          <a:fontRef idx="minor">
+            <a:schemeClr val="tx1"/>
+          </a:fontRef>
+        </p:style>
+      </p:cxnSp>
+      <p:cxnSp>
+        <p:nvCxnSpPr>
+          <p:cNvPr id="88" name="Straight Arrow Connector 87">
+            <a:extLst>
+              <a:ext uri="{FF2B5EF4-FFF2-40B4-BE49-F238E27FC236}">
+                <a16:creationId xmlns:a16="http://schemas.microsoft.com/office/drawing/2014/main" id="{F28445BB-6C1D-D028-44EB-426FA869EA73}"/>
+              </a:ext>
+            </a:extLst>
+          </p:cNvPr>
+          <p:cNvCxnSpPr>
+            <a:cxnSpLocks/>
+          </p:cNvCxnSpPr>
+          <p:nvPr/>
+        </p:nvCxnSpPr>
+        <p:spPr>
+          <a:xfrm>
+            <a:off x="9704137" y="3516740"/>
+            <a:ext cx="1" cy="434298"/>
+          </a:xfrm>
+          <a:prstGeom prst="straightConnector1">
+            <a:avLst/>
+          </a:prstGeom>
+          <a:ln>
+            <a:prstDash val="sysDash"/>
+            <a:tailEnd type="triangle"/>
+          </a:ln>
+        </p:spPr>
+        <p:style>
+          <a:lnRef idx="2">
+            <a:schemeClr val="accent1"/>
+          </a:lnRef>
+          <a:fillRef idx="0">
+            <a:schemeClr val="accent1"/>
+          </a:fillRef>
+          <a:effectRef idx="1">
+            <a:schemeClr val="accent1"/>
+          </a:effectRef>
+          <a:fontRef idx="minor">
+            <a:schemeClr val="tx1"/>
+          </a:fontRef>
+        </p:style>
+      </p:cxnSp>
+      <p:cxnSp>
+        <p:nvCxnSpPr>
+          <p:cNvPr id="90" name="Straight Arrow Connector 89">
+            <a:extLst>
+              <a:ext uri="{FF2B5EF4-FFF2-40B4-BE49-F238E27FC236}">
+                <a16:creationId xmlns:a16="http://schemas.microsoft.com/office/drawing/2014/main" id="{7DEF8381-AF4A-1C8D-CA4F-5EC6E25AE0D1}"/>
+              </a:ext>
+            </a:extLst>
+          </p:cNvPr>
+          <p:cNvCxnSpPr>
+            <a:cxnSpLocks/>
+            <a:stCxn id="82" idx="2"/>
+            <a:endCxn id="78" idx="0"/>
+          </p:cNvCxnSpPr>
+          <p:nvPr/>
+        </p:nvCxnSpPr>
+        <p:spPr>
+          <a:xfrm>
+            <a:off x="9700900" y="2862868"/>
+            <a:ext cx="0" cy="244358"/>
+          </a:xfrm>
+          <a:prstGeom prst="straightConnector1">
+            <a:avLst/>
+          </a:prstGeom>
+          <a:ln>
+            <a:tailEnd type="triangle"/>
+          </a:ln>
+        </p:spPr>
+        <p:style>
+          <a:lnRef idx="2">
+            <a:schemeClr val="dk1"/>
+          </a:lnRef>
+          <a:fillRef idx="0">
+            <a:schemeClr val="dk1"/>
+          </a:fillRef>
+          <a:effectRef idx="1">
+            <a:schemeClr val="dk1"/>
+          </a:effectRef>
+          <a:fontRef idx="minor">
+            <a:schemeClr val="tx1"/>
+          </a:fontRef>
+        </p:style>
+      </p:cxnSp>
+      <p:sp>
+        <p:nvSpPr>
+          <p:cNvPr id="95" name="TextBox 94">
+            <a:extLst>
+              <a:ext uri="{FF2B5EF4-FFF2-40B4-BE49-F238E27FC236}">
+                <a16:creationId xmlns:a16="http://schemas.microsoft.com/office/drawing/2014/main" id="{090A86F7-DD3C-69A4-9535-EC02D3958741}"/>
+              </a:ext>
+            </a:extLst>
+          </p:cNvPr>
+          <p:cNvSpPr txBox="1"/>
+          <p:nvPr/>
+        </p:nvSpPr>
+        <p:spPr>
+          <a:xfrm>
+            <a:off x="9216814" y="3991641"/>
+            <a:ext cx="1292603" cy="276999"/>
+          </a:xfrm>
+          <a:prstGeom prst="rect">
+            <a:avLst/>
+          </a:prstGeom>
+        </p:spPr>
+        <p:style>
+          <a:lnRef idx="2">
+            <a:schemeClr val="dk1"/>
+          </a:lnRef>
+          <a:fillRef idx="1">
+            <a:schemeClr val="lt1"/>
+          </a:fillRef>
+          <a:effectRef idx="0">
+            <a:schemeClr val="dk1"/>
+          </a:effectRef>
+          <a:fontRef idx="minor">
+            <a:schemeClr val="dk1"/>
+          </a:fontRef>
+        </p:style>
+        <p:txBody>
+          <a:bodyPr wrap="square" rtlCol="0">
+            <a:spAutoFit/>
+          </a:bodyPr>
+          <a:lstStyle/>
+          <a:p>
+            <a:r>
+              <a:rPr lang="en-US" altLang="zh-CN" sz="1200" b="1" dirty="0"/>
+              <a:t>Web-Browser </a:t>
+            </a:r>
+            <a:endParaRPr lang="zh-CN" altLang="en-US" sz="1200" dirty="0"/>
+          </a:p>
+        </p:txBody>
+      </p:sp>
+      <p:pic>
+        <p:nvPicPr>
+          <p:cNvPr id="97" name="Picture 96">
+            <a:extLst>
+              <a:ext uri="{FF2B5EF4-FFF2-40B4-BE49-F238E27FC236}">
+                <a16:creationId xmlns:a16="http://schemas.microsoft.com/office/drawing/2014/main" id="{D1F7042D-354F-3908-E764-0312869F52A9}"/>
+              </a:ext>
+            </a:extLst>
+          </p:cNvPr>
+          <p:cNvPicPr>
+            <a:picLocks noChangeAspect="1"/>
+          </p:cNvPicPr>
+          <p:nvPr/>
+        </p:nvPicPr>
+        <p:blipFill>
+          <a:blip r:embed="rId2"/>
+          <a:stretch>
+            <a:fillRect/>
+          </a:stretch>
+        </p:blipFill>
+        <p:spPr>
+          <a:xfrm>
+            <a:off x="9567323" y="3575580"/>
+            <a:ext cx="261165" cy="276835"/>
+          </a:xfrm>
+          <a:prstGeom prst="rect">
+            <a:avLst/>
+          </a:prstGeom>
+        </p:spPr>
+      </p:pic>
+      <p:pic>
+        <p:nvPicPr>
+          <p:cNvPr id="98" name="Picture 97">
+            <a:extLst>
+              <a:ext uri="{FF2B5EF4-FFF2-40B4-BE49-F238E27FC236}">
+                <a16:creationId xmlns:a16="http://schemas.microsoft.com/office/drawing/2014/main" id="{ED944A51-E086-C35D-6158-74C913C5FDC7}"/>
+              </a:ext>
+            </a:extLst>
+          </p:cNvPr>
+          <p:cNvPicPr>
+            <a:picLocks noChangeAspect="1"/>
+          </p:cNvPicPr>
+          <p:nvPr/>
+        </p:nvPicPr>
+        <p:blipFill>
+          <a:blip r:embed="rId5"/>
+          <a:stretch>
+            <a:fillRect/>
+          </a:stretch>
+        </p:blipFill>
+        <p:spPr>
+          <a:xfrm>
+            <a:off x="10278375" y="4057257"/>
+            <a:ext cx="176680" cy="175361"/>
+          </a:xfrm>
+          <a:prstGeom prst="rect">
+            <a:avLst/>
+          </a:prstGeom>
+        </p:spPr>
+      </p:pic>
+      <p:sp>
+        <p:nvSpPr>
+          <p:cNvPr id="101" name="TextBox 100">
+            <a:extLst>
+              <a:ext uri="{FF2B5EF4-FFF2-40B4-BE49-F238E27FC236}">
+                <a16:creationId xmlns:a16="http://schemas.microsoft.com/office/drawing/2014/main" id="{36A592AB-AE90-FACA-BCD5-C242C6E8F792}"/>
+              </a:ext>
+            </a:extLst>
+          </p:cNvPr>
+          <p:cNvSpPr txBox="1"/>
+          <p:nvPr/>
+        </p:nvSpPr>
+        <p:spPr>
+          <a:xfrm>
+            <a:off x="6313252" y="2356735"/>
+            <a:ext cx="764565" cy="253916"/>
+          </a:xfrm>
+          <a:prstGeom prst="rect">
+            <a:avLst/>
+          </a:prstGeom>
+          <a:noFill/>
+        </p:spPr>
+        <p:txBody>
+          <a:bodyPr wrap="square" rtlCol="0">
+            <a:spAutoFit/>
+          </a:bodyPr>
+          <a:lstStyle/>
+          <a:p>
+            <a:r>
+              <a:rPr lang="en-US" sz="1050" b="1" dirty="0"/>
+              <a:t>Network</a:t>
+            </a:r>
+            <a:r>
+              <a:rPr lang="en-US" sz="1050" b="1" dirty="0">
+                <a:solidFill>
+                  <a:schemeClr val="tx2">
+                    <a:lumMod val="75000"/>
+                    <a:lumOff val="25000"/>
+                  </a:schemeClr>
+                </a:solidFill>
+              </a:rPr>
+              <a:t> </a:t>
+            </a:r>
+            <a:endParaRPr lang="en-SG" sz="1050" b="1" dirty="0">
+              <a:solidFill>
+                <a:schemeClr val="tx2">
+                  <a:lumMod val="75000"/>
+                  <a:lumOff val="25000"/>
+                </a:schemeClr>
+              </a:solidFill>
+            </a:endParaRPr>
+          </a:p>
+        </p:txBody>
+      </p:sp>
+      <p:sp>
+        <p:nvSpPr>
+          <p:cNvPr id="104" name="TextBox 103">
+            <a:extLst>
+              <a:ext uri="{FF2B5EF4-FFF2-40B4-BE49-F238E27FC236}">
+                <a16:creationId xmlns:a16="http://schemas.microsoft.com/office/drawing/2014/main" id="{36069048-C737-E667-7FA4-544F357FD4D9}"/>
+              </a:ext>
+            </a:extLst>
+          </p:cNvPr>
+          <p:cNvSpPr txBox="1"/>
+          <p:nvPr/>
+        </p:nvSpPr>
+        <p:spPr>
+          <a:xfrm>
+            <a:off x="3390088" y="550897"/>
+            <a:ext cx="2290559" cy="307777"/>
+          </a:xfrm>
+          <a:prstGeom prst="rect">
+            <a:avLst/>
+          </a:prstGeom>
+          <a:noFill/>
+        </p:spPr>
+        <p:txBody>
+          <a:bodyPr wrap="square" rtlCol="0">
+            <a:spAutoFit/>
+          </a:bodyPr>
+          <a:lstStyle/>
+          <a:p>
+            <a:r>
+              <a:rPr lang="en-US" sz="1400" b="1" dirty="0">
+                <a:solidFill>
+                  <a:schemeClr val="accent2">
+                    <a:lumMod val="75000"/>
+                  </a:schemeClr>
+                </a:solidFill>
+              </a:rPr>
+              <a:t>Computers Cluster Node</a:t>
+            </a:r>
+            <a:endParaRPr lang="en-SG" sz="1400" b="1" dirty="0">
+              <a:solidFill>
+                <a:schemeClr val="accent2">
+                  <a:lumMod val="75000"/>
+                </a:schemeClr>
+              </a:solidFill>
+            </a:endParaRPr>
+          </a:p>
+        </p:txBody>
+      </p:sp>
+      <p:sp>
+        <p:nvSpPr>
+          <p:cNvPr id="105" name="TextBox 104">
+            <a:extLst>
+              <a:ext uri="{FF2B5EF4-FFF2-40B4-BE49-F238E27FC236}">
+                <a16:creationId xmlns:a16="http://schemas.microsoft.com/office/drawing/2014/main" id="{0F09C422-F843-3FE8-8A20-6FE006A683FC}"/>
+              </a:ext>
+            </a:extLst>
+          </p:cNvPr>
+          <p:cNvSpPr txBox="1"/>
+          <p:nvPr/>
+        </p:nvSpPr>
+        <p:spPr>
+          <a:xfrm>
+            <a:off x="7657592" y="624966"/>
+            <a:ext cx="1964121" cy="307777"/>
+          </a:xfrm>
+          <a:prstGeom prst="rect">
+            <a:avLst/>
+          </a:prstGeom>
+          <a:noFill/>
+        </p:spPr>
+        <p:txBody>
+          <a:bodyPr wrap="square" rtlCol="0">
+            <a:spAutoFit/>
+          </a:bodyPr>
+          <a:lstStyle/>
+          <a:p>
+            <a:r>
+              <a:rPr lang="en-US" sz="1400" b="1" dirty="0">
+                <a:solidFill>
+                  <a:schemeClr val="accent6">
+                    <a:lumMod val="75000"/>
+                  </a:schemeClr>
+                </a:solidFill>
+              </a:rPr>
+              <a:t>Log Archive Server</a:t>
+            </a:r>
+            <a:endParaRPr lang="en-SG" sz="1400" b="1" dirty="0">
+              <a:solidFill>
+                <a:schemeClr val="accent6">
+                  <a:lumMod val="75000"/>
+                </a:schemeClr>
+              </a:solidFill>
+            </a:endParaRPr>
+          </a:p>
+        </p:txBody>
+      </p:sp>
+    </p:spTree>
+    <p:extLst>
+      <p:ext uri="{BB962C8B-B14F-4D97-AF65-F5344CB8AC3E}">
+        <p14:creationId xmlns:p14="http://schemas.microsoft.com/office/powerpoint/2010/main" val="2627749273"/>
       </p:ext>
     </p:extLst>
   </p:cSld>

</xml_diff>

<commit_message>
Update the read me file and added the problem and solution document.
</commit_message>
<xml_diff>
--- a/doc/designDoc.pptx
+++ b/doc/designDoc.pptx
@@ -7,6 +7,7 @@
   <p:sldIdLst>
     <p:sldId id="256" r:id="rId2"/>
     <p:sldId id="257" r:id="rId3"/>
+    <p:sldId id="258" r:id="rId4"/>
   </p:sldIdLst>
   <p:sldSz cx="12192000" cy="6858000"/>
   <p:notesSz cx="6858000" cy="9144000"/>
@@ -262,7 +263,7 @@
           <a:p>
             <a:fld id="{4F22881B-C043-472B-8163-4AE4B452EA80}" type="datetimeFigureOut">
               <a:rPr lang="en-SG" smtClean="0"/>
-              <a:t>26/7/2024</a:t>
+              <a:t>27/7/2024</a:t>
             </a:fld>
             <a:endParaRPr lang="en-SG"/>
           </a:p>
@@ -462,7 +463,7 @@
           <a:p>
             <a:fld id="{4F22881B-C043-472B-8163-4AE4B452EA80}" type="datetimeFigureOut">
               <a:rPr lang="en-SG" smtClean="0"/>
-              <a:t>26/7/2024</a:t>
+              <a:t>27/7/2024</a:t>
             </a:fld>
             <a:endParaRPr lang="en-SG"/>
           </a:p>
@@ -672,7 +673,7 @@
           <a:p>
             <a:fld id="{4F22881B-C043-472B-8163-4AE4B452EA80}" type="datetimeFigureOut">
               <a:rPr lang="en-SG" smtClean="0"/>
-              <a:t>26/7/2024</a:t>
+              <a:t>27/7/2024</a:t>
             </a:fld>
             <a:endParaRPr lang="en-SG"/>
           </a:p>
@@ -872,7 +873,7 @@
           <a:p>
             <a:fld id="{4F22881B-C043-472B-8163-4AE4B452EA80}" type="datetimeFigureOut">
               <a:rPr lang="en-SG" smtClean="0"/>
-              <a:t>26/7/2024</a:t>
+              <a:t>27/7/2024</a:t>
             </a:fld>
             <a:endParaRPr lang="en-SG"/>
           </a:p>
@@ -1148,7 +1149,7 @@
           <a:p>
             <a:fld id="{4F22881B-C043-472B-8163-4AE4B452EA80}" type="datetimeFigureOut">
               <a:rPr lang="en-SG" smtClean="0"/>
-              <a:t>26/7/2024</a:t>
+              <a:t>27/7/2024</a:t>
             </a:fld>
             <a:endParaRPr lang="en-SG"/>
           </a:p>
@@ -1416,7 +1417,7 @@
           <a:p>
             <a:fld id="{4F22881B-C043-472B-8163-4AE4B452EA80}" type="datetimeFigureOut">
               <a:rPr lang="en-SG" smtClean="0"/>
-              <a:t>26/7/2024</a:t>
+              <a:t>27/7/2024</a:t>
             </a:fld>
             <a:endParaRPr lang="en-SG"/>
           </a:p>
@@ -1831,7 +1832,7 @@
           <a:p>
             <a:fld id="{4F22881B-C043-472B-8163-4AE4B452EA80}" type="datetimeFigureOut">
               <a:rPr lang="en-SG" smtClean="0"/>
-              <a:t>26/7/2024</a:t>
+              <a:t>27/7/2024</a:t>
             </a:fld>
             <a:endParaRPr lang="en-SG"/>
           </a:p>
@@ -1973,7 +1974,7 @@
           <a:p>
             <a:fld id="{4F22881B-C043-472B-8163-4AE4B452EA80}" type="datetimeFigureOut">
               <a:rPr lang="en-SG" smtClean="0"/>
-              <a:t>26/7/2024</a:t>
+              <a:t>27/7/2024</a:t>
             </a:fld>
             <a:endParaRPr lang="en-SG"/>
           </a:p>
@@ -2086,7 +2087,7 @@
           <a:p>
             <a:fld id="{4F22881B-C043-472B-8163-4AE4B452EA80}" type="datetimeFigureOut">
               <a:rPr lang="en-SG" smtClean="0"/>
-              <a:t>26/7/2024</a:t>
+              <a:t>27/7/2024</a:t>
             </a:fld>
             <a:endParaRPr lang="en-SG"/>
           </a:p>
@@ -2399,7 +2400,7 @@
           <a:p>
             <a:fld id="{4F22881B-C043-472B-8163-4AE4B452EA80}" type="datetimeFigureOut">
               <a:rPr lang="en-SG" smtClean="0"/>
-              <a:t>26/7/2024</a:t>
+              <a:t>27/7/2024</a:t>
             </a:fld>
             <a:endParaRPr lang="en-SG"/>
           </a:p>
@@ -2688,7 +2689,7 @@
           <a:p>
             <a:fld id="{4F22881B-C043-472B-8163-4AE4B452EA80}" type="datetimeFigureOut">
               <a:rPr lang="en-SG" smtClean="0"/>
-              <a:t>26/7/2024</a:t>
+              <a:t>27/7/2024</a:t>
             </a:fld>
             <a:endParaRPr lang="en-SG"/>
           </a:p>
@@ -2931,7 +2932,7 @@
           <a:p>
             <a:fld id="{4F22881B-C043-472B-8163-4AE4B452EA80}" type="datetimeFigureOut">
               <a:rPr lang="en-SG" smtClean="0"/>
-              <a:t>26/7/2024</a:t>
+              <a:t>27/7/2024</a:t>
             </a:fld>
             <a:endParaRPr lang="en-SG"/>
           </a:p>
@@ -10011,6 +10012,96 @@
     <p:extLst>
       <p:ext uri="{BB962C8B-B14F-4D97-AF65-F5344CB8AC3E}">
         <p14:creationId xmlns:p14="http://schemas.microsoft.com/office/powerpoint/2010/main" val="2627749273"/>
+      </p:ext>
+    </p:extLst>
+  </p:cSld>
+  <p:clrMapOvr>
+    <a:masterClrMapping/>
+  </p:clrMapOvr>
+</p:sld>
+</file>
+
+<file path=ppt/slides/slide3.xml><?xml version="1.0" encoding="utf-8"?>
+<p:sld xmlns:a="http://schemas.openxmlformats.org/drawingml/2006/main" xmlns:r="http://schemas.openxmlformats.org/officeDocument/2006/relationships" xmlns:p="http://schemas.openxmlformats.org/presentationml/2006/main">
+  <p:cSld>
+    <p:spTree>
+      <p:nvGrpSpPr>
+        <p:cNvPr id="1" name=""/>
+        <p:cNvGrpSpPr/>
+        <p:nvPr/>
+      </p:nvGrpSpPr>
+      <p:grpSpPr>
+        <a:xfrm>
+          <a:off x="0" y="0"/>
+          <a:ext cx="0" cy="0"/>
+          <a:chOff x="0" y="0"/>
+          <a:chExt cx="0" cy="0"/>
+        </a:xfrm>
+      </p:grpSpPr>
+      <p:pic>
+        <p:nvPicPr>
+          <p:cNvPr id="5" name="Picture 4">
+            <a:extLst>
+              <a:ext uri="{FF2B5EF4-FFF2-40B4-BE49-F238E27FC236}">
+                <a16:creationId xmlns:a16="http://schemas.microsoft.com/office/drawing/2014/main" id="{0C06AF04-D9A8-111A-8F54-653082C3EF16}"/>
+              </a:ext>
+            </a:extLst>
+          </p:cNvPr>
+          <p:cNvPicPr>
+            <a:picLocks noChangeAspect="1"/>
+          </p:cNvPicPr>
+          <p:nvPr/>
+        </p:nvPicPr>
+        <p:blipFill>
+          <a:blip r:embed="rId2"/>
+          <a:stretch>
+            <a:fillRect/>
+          </a:stretch>
+        </p:blipFill>
+        <p:spPr>
+          <a:xfrm>
+            <a:off x="1091822" y="1225204"/>
+            <a:ext cx="5902804" cy="3584632"/>
+          </a:xfrm>
+          <a:prstGeom prst="rect">
+            <a:avLst/>
+          </a:prstGeom>
+        </p:spPr>
+      </p:pic>
+      <p:pic>
+        <p:nvPicPr>
+          <p:cNvPr id="7" name="Picture 6">
+            <a:extLst>
+              <a:ext uri="{FF2B5EF4-FFF2-40B4-BE49-F238E27FC236}">
+                <a16:creationId xmlns:a16="http://schemas.microsoft.com/office/drawing/2014/main" id="{B4C43895-DC4A-69B6-B73A-C4DB5FF250C5}"/>
+              </a:ext>
+            </a:extLst>
+          </p:cNvPr>
+          <p:cNvPicPr>
+            <a:picLocks noChangeAspect="1"/>
+          </p:cNvPicPr>
+          <p:nvPr/>
+        </p:nvPicPr>
+        <p:blipFill>
+          <a:blip r:embed="rId3"/>
+          <a:stretch>
+            <a:fillRect/>
+          </a:stretch>
+        </p:blipFill>
+        <p:spPr>
+          <a:xfrm>
+            <a:off x="2756030" y="1956816"/>
+            <a:ext cx="6309354" cy="3831520"/>
+          </a:xfrm>
+          <a:prstGeom prst="rect">
+            <a:avLst/>
+          </a:prstGeom>
+        </p:spPr>
+      </p:pic>
+    </p:spTree>
+    <p:extLst>
+      <p:ext uri="{BB962C8B-B14F-4D97-AF65-F5344CB8AC3E}">
+        <p14:creationId xmlns:p14="http://schemas.microsoft.com/office/powerpoint/2010/main" val="1809835224"/>
       </p:ext>
     </p:extLst>
   </p:cSld>

</xml_diff>

<commit_message>
Changed the log archive viewer server web host program to use the bootstrap css.
</commit_message>
<xml_diff>
--- a/doc/designDoc.pptx
+++ b/doc/designDoc.pptx
@@ -263,7 +263,7 @@
           <a:p>
             <a:fld id="{4F22881B-C043-472B-8163-4AE4B452EA80}" type="datetimeFigureOut">
               <a:rPr lang="en-SG" smtClean="0"/>
-              <a:t>27/7/2024</a:t>
+              <a:t>20/8/2024</a:t>
             </a:fld>
             <a:endParaRPr lang="en-SG"/>
           </a:p>
@@ -463,7 +463,7 @@
           <a:p>
             <a:fld id="{4F22881B-C043-472B-8163-4AE4B452EA80}" type="datetimeFigureOut">
               <a:rPr lang="en-SG" smtClean="0"/>
-              <a:t>27/7/2024</a:t>
+              <a:t>20/8/2024</a:t>
             </a:fld>
             <a:endParaRPr lang="en-SG"/>
           </a:p>
@@ -673,7 +673,7 @@
           <a:p>
             <a:fld id="{4F22881B-C043-472B-8163-4AE4B452EA80}" type="datetimeFigureOut">
               <a:rPr lang="en-SG" smtClean="0"/>
-              <a:t>27/7/2024</a:t>
+              <a:t>20/8/2024</a:t>
             </a:fld>
             <a:endParaRPr lang="en-SG"/>
           </a:p>
@@ -873,7 +873,7 @@
           <a:p>
             <a:fld id="{4F22881B-C043-472B-8163-4AE4B452EA80}" type="datetimeFigureOut">
               <a:rPr lang="en-SG" smtClean="0"/>
-              <a:t>27/7/2024</a:t>
+              <a:t>20/8/2024</a:t>
             </a:fld>
             <a:endParaRPr lang="en-SG"/>
           </a:p>
@@ -1149,7 +1149,7 @@
           <a:p>
             <a:fld id="{4F22881B-C043-472B-8163-4AE4B452EA80}" type="datetimeFigureOut">
               <a:rPr lang="en-SG" smtClean="0"/>
-              <a:t>27/7/2024</a:t>
+              <a:t>20/8/2024</a:t>
             </a:fld>
             <a:endParaRPr lang="en-SG"/>
           </a:p>
@@ -1417,7 +1417,7 @@
           <a:p>
             <a:fld id="{4F22881B-C043-472B-8163-4AE4B452EA80}" type="datetimeFigureOut">
               <a:rPr lang="en-SG" smtClean="0"/>
-              <a:t>27/7/2024</a:t>
+              <a:t>20/8/2024</a:t>
             </a:fld>
             <a:endParaRPr lang="en-SG"/>
           </a:p>
@@ -1832,7 +1832,7 @@
           <a:p>
             <a:fld id="{4F22881B-C043-472B-8163-4AE4B452EA80}" type="datetimeFigureOut">
               <a:rPr lang="en-SG" smtClean="0"/>
-              <a:t>27/7/2024</a:t>
+              <a:t>20/8/2024</a:t>
             </a:fld>
             <a:endParaRPr lang="en-SG"/>
           </a:p>
@@ -1974,7 +1974,7 @@
           <a:p>
             <a:fld id="{4F22881B-C043-472B-8163-4AE4B452EA80}" type="datetimeFigureOut">
               <a:rPr lang="en-SG" smtClean="0"/>
-              <a:t>27/7/2024</a:t>
+              <a:t>20/8/2024</a:t>
             </a:fld>
             <a:endParaRPr lang="en-SG"/>
           </a:p>
@@ -2087,7 +2087,7 @@
           <a:p>
             <a:fld id="{4F22881B-C043-472B-8163-4AE4B452EA80}" type="datetimeFigureOut">
               <a:rPr lang="en-SG" smtClean="0"/>
-              <a:t>27/7/2024</a:t>
+              <a:t>20/8/2024</a:t>
             </a:fld>
             <a:endParaRPr lang="en-SG"/>
           </a:p>
@@ -2400,7 +2400,7 @@
           <a:p>
             <a:fld id="{4F22881B-C043-472B-8163-4AE4B452EA80}" type="datetimeFigureOut">
               <a:rPr lang="en-SG" smtClean="0"/>
-              <a:t>27/7/2024</a:t>
+              <a:t>20/8/2024</a:t>
             </a:fld>
             <a:endParaRPr lang="en-SG"/>
           </a:p>
@@ -2689,7 +2689,7 @@
           <a:p>
             <a:fld id="{4F22881B-C043-472B-8163-4AE4B452EA80}" type="datetimeFigureOut">
               <a:rPr lang="en-SG" smtClean="0"/>
-              <a:t>27/7/2024</a:t>
+              <a:t>20/8/2024</a:t>
             </a:fld>
             <a:endParaRPr lang="en-SG"/>
           </a:p>
@@ -2932,7 +2932,7 @@
           <a:p>
             <a:fld id="{4F22881B-C043-472B-8163-4AE4B452EA80}" type="datetimeFigureOut">
               <a:rPr lang="en-SG" smtClean="0"/>
-              <a:t>27/7/2024</a:t>
+              <a:t>20/8/2024</a:t>
             </a:fld>
             <a:endParaRPr lang="en-SG"/>
           </a:p>
@@ -7051,6 +7051,153 @@
           </a:p>
         </p:txBody>
       </p:sp>
+      <p:sp>
+        <p:nvSpPr>
+          <p:cNvPr id="6" name="AutoShape 4" descr="Free Log File Icon - Free Download Files &amp; Folders Icons ...">
+            <a:extLst>
+              <a:ext uri="{FF2B5EF4-FFF2-40B4-BE49-F238E27FC236}">
+                <a16:creationId xmlns:a16="http://schemas.microsoft.com/office/drawing/2014/main" id="{082C8166-318A-90BC-5454-D4139A8C1AD5}"/>
+              </a:ext>
+            </a:extLst>
+          </p:cNvPr>
+          <p:cNvSpPr>
+            <a:spLocks noChangeAspect="1" noChangeArrowheads="1"/>
+          </p:cNvSpPr>
+          <p:nvPr/>
+        </p:nvSpPr>
+        <p:spPr bwMode="auto">
+          <a:xfrm>
+            <a:off x="5943600" y="3276600"/>
+            <a:ext cx="304800" cy="304800"/>
+          </a:xfrm>
+          <a:prstGeom prst="rect">
+            <a:avLst/>
+          </a:prstGeom>
+          <a:noFill/>
+          <a:extLst>
+            <a:ext uri="{909E8E84-426E-40DD-AFC4-6F175D3DCCD1}">
+              <a14:hiddenFill xmlns:a14="http://schemas.microsoft.com/office/drawing/2010/main">
+                <a:solidFill>
+                  <a:srgbClr val="FFFFFF"/>
+                </a:solidFill>
+              </a14:hiddenFill>
+            </a:ext>
+          </a:extLst>
+        </p:spPr>
+        <p:txBody>
+          <a:bodyPr vert="horz" wrap="square" lIns="91440" tIns="45720" rIns="91440" bIns="45720" numCol="1" anchor="t" anchorCtr="0" compatLnSpc="1">
+            <a:prstTxWarp prst="textNoShape">
+              <a:avLst/>
+            </a:prstTxWarp>
+          </a:bodyPr>
+          <a:lstStyle/>
+          <a:p>
+            <a:endParaRPr lang="en-SG"/>
+          </a:p>
+        </p:txBody>
+      </p:sp>
+      <p:pic>
+        <p:nvPicPr>
+          <p:cNvPr id="10" name="Picture 9">
+            <a:extLst>
+              <a:ext uri="{FF2B5EF4-FFF2-40B4-BE49-F238E27FC236}">
+                <a16:creationId xmlns:a16="http://schemas.microsoft.com/office/drawing/2014/main" id="{E62B38D9-51BA-9FC9-6A7C-7384C8718816}"/>
+              </a:ext>
+            </a:extLst>
+          </p:cNvPr>
+          <p:cNvPicPr>
+            <a:picLocks noChangeAspect="1"/>
+          </p:cNvPicPr>
+          <p:nvPr/>
+        </p:nvPicPr>
+        <p:blipFill>
+          <a:blip r:embed="rId8"/>
+          <a:stretch>
+            <a:fillRect/>
+          </a:stretch>
+        </p:blipFill>
+        <p:spPr>
+          <a:xfrm>
+            <a:off x="2879160" y="5347292"/>
+            <a:ext cx="939617" cy="958561"/>
+          </a:xfrm>
+          <a:prstGeom prst="rect">
+            <a:avLst/>
+          </a:prstGeom>
+        </p:spPr>
+      </p:pic>
+      <p:pic>
+        <p:nvPicPr>
+          <p:cNvPr id="3" name="Graphic 2" descr="Eye with solid fill">
+            <a:extLst>
+              <a:ext uri="{FF2B5EF4-FFF2-40B4-BE49-F238E27FC236}">
+                <a16:creationId xmlns:a16="http://schemas.microsoft.com/office/drawing/2014/main" id="{273057B5-9446-4DDC-7429-6735A8DA9581}"/>
+              </a:ext>
+            </a:extLst>
+          </p:cNvPr>
+          <p:cNvPicPr>
+            <a:picLocks noChangeAspect="1"/>
+          </p:cNvPicPr>
+          <p:nvPr/>
+        </p:nvPicPr>
+        <p:blipFill>
+          <a:blip r:embed="rId9">
+            <a:extLst>
+              <a:ext uri="{96DAC541-7B7A-43D3-8B79-37D633B846F1}">
+                <asvg:svgBlip xmlns:asvg="http://schemas.microsoft.com/office/drawing/2016/SVG/main" r:embed="rId10"/>
+              </a:ext>
+            </a:extLst>
+          </a:blip>
+          <a:stretch>
+            <a:fillRect/>
+          </a:stretch>
+        </p:blipFill>
+        <p:spPr>
+          <a:xfrm>
+            <a:off x="3663053" y="5274908"/>
+            <a:ext cx="611869" cy="611869"/>
+          </a:xfrm>
+          <a:prstGeom prst="rect">
+            <a:avLst/>
+          </a:prstGeom>
+        </p:spPr>
+      </p:pic>
+      <p:pic>
+        <p:nvPicPr>
+          <p:cNvPr id="16" name="Graphic 15" descr="Filing Box Archive with solid fill">
+            <a:extLst>
+              <a:ext uri="{FF2B5EF4-FFF2-40B4-BE49-F238E27FC236}">
+                <a16:creationId xmlns:a16="http://schemas.microsoft.com/office/drawing/2014/main" id="{F3A6C0AF-CE11-9D4D-4AD4-53104EB9EEC3}"/>
+              </a:ext>
+            </a:extLst>
+          </p:cNvPr>
+          <p:cNvPicPr>
+            <a:picLocks noChangeAspect="1"/>
+          </p:cNvPicPr>
+          <p:nvPr/>
+        </p:nvPicPr>
+        <p:blipFill>
+          <a:blip r:embed="rId11">
+            <a:extLst>
+              <a:ext uri="{96DAC541-7B7A-43D3-8B79-37D633B846F1}">
+                <asvg:svgBlip xmlns:asvg="http://schemas.microsoft.com/office/drawing/2016/SVG/main" r:embed="rId12"/>
+              </a:ext>
+            </a:extLst>
+          </a:blip>
+          <a:stretch>
+            <a:fillRect/>
+          </a:stretch>
+        </p:blipFill>
+        <p:spPr>
+          <a:xfrm>
+            <a:off x="3718944" y="5807476"/>
+            <a:ext cx="555978" cy="555978"/>
+          </a:xfrm>
+          <a:prstGeom prst="rect">
+            <a:avLst/>
+          </a:prstGeom>
+        </p:spPr>
+      </p:pic>
     </p:spTree>
     <p:extLst>
       <p:ext uri="{BB962C8B-B14F-4D97-AF65-F5344CB8AC3E}">

</xml_diff>